<commit_message>
Modified for initial submission
</commit_message>
<xml_diff>
--- a/Final Project Draft.pptx
+++ b/Final Project Draft.pptx
@@ -7,12 +7,14 @@
   <p:sldIdLst>
     <p:sldId id="256" r:id="rId2"/>
     <p:sldId id="257" r:id="rId3"/>
-    <p:sldId id="263" r:id="rId4"/>
-    <p:sldId id="262" r:id="rId5"/>
-    <p:sldId id="258" r:id="rId6"/>
-    <p:sldId id="259" r:id="rId7"/>
-    <p:sldId id="261" r:id="rId8"/>
-    <p:sldId id="260" r:id="rId9"/>
+    <p:sldId id="265" r:id="rId4"/>
+    <p:sldId id="266" r:id="rId5"/>
+    <p:sldId id="262" r:id="rId6"/>
+    <p:sldId id="260" r:id="rId7"/>
+    <p:sldId id="259" r:id="rId8"/>
+    <p:sldId id="261" r:id="rId9"/>
+    <p:sldId id="263" r:id="rId10"/>
+    <p:sldId id="258" r:id="rId11"/>
   </p:sldIdLst>
   <p:sldSz cx="12192000" cy="6858000"/>
   <p:notesSz cx="6858000" cy="9144000"/>
@@ -169,7 +171,7 @@
           <a:noFill/>
           <a:extLst>
             <a:ext uri="{909E8E84-426E-40dd-AFC4-6F175D3DCCD1}">
-              <a14:hiddenFill xmlns="" xmlns:a14="http://schemas.microsoft.com/office/drawing/2010/main">
+              <a14:hiddenFill xmlns:a14="http://schemas.microsoft.com/office/drawing/2010/main" xmlns="">
                 <a:solidFill>
                   <a:srgbClr val="FFFFFF"/>
                 </a:solidFill>
@@ -229,7 +231,7 @@
             </a:ln>
             <a:extLst>
               <a:ext uri="{91240B29-F687-4f45-9708-019B960494DF}">
-                <a14:hiddenLine xmlns="" xmlns:a14="http://schemas.microsoft.com/office/drawing/2010/main" w="9525">
+                <a14:hiddenLine xmlns:a14="http://schemas.microsoft.com/office/drawing/2010/main" xmlns="" w="9525">
                   <a:solidFill>
                     <a:srgbClr val="000000"/>
                   </a:solidFill>
@@ -319,7 +321,7 @@
             </a:ln>
             <a:extLst>
               <a:ext uri="{91240B29-F687-4f45-9708-019B960494DF}">
-                <a14:hiddenLine xmlns="" xmlns:a14="http://schemas.microsoft.com/office/drawing/2010/main" w="9525">
+                <a14:hiddenLine xmlns:a14="http://schemas.microsoft.com/office/drawing/2010/main" xmlns="" w="9525">
                   <a:solidFill>
                     <a:srgbClr val="000000"/>
                   </a:solidFill>
@@ -409,7 +411,7 @@
             </a:ln>
             <a:extLst>
               <a:ext uri="{91240B29-F687-4f45-9708-019B960494DF}">
-                <a14:hiddenLine xmlns="" xmlns:a14="http://schemas.microsoft.com/office/drawing/2010/main" w="9525">
+                <a14:hiddenLine xmlns:a14="http://schemas.microsoft.com/office/drawing/2010/main" xmlns="" w="9525">
                   <a:solidFill>
                     <a:srgbClr val="000000"/>
                   </a:solidFill>
@@ -443,7 +445,7 @@
             </a:ln>
             <a:extLst>
               <a:ext uri="{91240B29-F687-4f45-9708-019B960494DF}">
-                <a14:hiddenLine xmlns="" xmlns:a14="http://schemas.microsoft.com/office/drawing/2010/main" w="9525">
+                <a14:hiddenLine xmlns:a14="http://schemas.microsoft.com/office/drawing/2010/main" xmlns="" w="9525">
                   <a:solidFill>
                     <a:srgbClr val="000000"/>
                   </a:solidFill>
@@ -533,7 +535,7 @@
             </a:ln>
             <a:extLst>
               <a:ext uri="{91240B29-F687-4f45-9708-019B960494DF}">
-                <a14:hiddenLine xmlns="" xmlns:a14="http://schemas.microsoft.com/office/drawing/2010/main" w="9525">
+                <a14:hiddenLine xmlns:a14="http://schemas.microsoft.com/office/drawing/2010/main" xmlns="" w="9525">
                   <a:solidFill>
                     <a:srgbClr val="000000"/>
                   </a:solidFill>
@@ -595,7 +597,7 @@
             </a:ln>
             <a:extLst>
               <a:ext uri="{91240B29-F687-4f45-9708-019B960494DF}">
-                <a14:hiddenLine xmlns="" xmlns:a14="http://schemas.microsoft.com/office/drawing/2010/main" w="9525">
+                <a14:hiddenLine xmlns:a14="http://schemas.microsoft.com/office/drawing/2010/main" xmlns="" w="9525">
                   <a:solidFill>
                     <a:srgbClr val="000000"/>
                   </a:solidFill>
@@ -657,7 +659,7 @@
             </a:ln>
             <a:extLst>
               <a:ext uri="{91240B29-F687-4f45-9708-019B960494DF}">
-                <a14:hiddenLine xmlns="" xmlns:a14="http://schemas.microsoft.com/office/drawing/2010/main" w="9525">
+                <a14:hiddenLine xmlns:a14="http://schemas.microsoft.com/office/drawing/2010/main" xmlns="" w="9525">
                   <a:solidFill>
                     <a:srgbClr val="000000"/>
                   </a:solidFill>
@@ -747,7 +749,7 @@
             </a:ln>
             <a:extLst>
               <a:ext uri="{91240B29-F687-4f45-9708-019B960494DF}">
-                <a14:hiddenLine xmlns="" xmlns:a14="http://schemas.microsoft.com/office/drawing/2010/main" w="9525">
+                <a14:hiddenLine xmlns:a14="http://schemas.microsoft.com/office/drawing/2010/main" xmlns="" w="9525">
                   <a:solidFill>
                     <a:srgbClr val="000000"/>
                   </a:solidFill>
@@ -809,7 +811,7 @@
             </a:ln>
             <a:extLst>
               <a:ext uri="{91240B29-F687-4f45-9708-019B960494DF}">
-                <a14:hiddenLine xmlns="" xmlns:a14="http://schemas.microsoft.com/office/drawing/2010/main" w="9525">
+                <a14:hiddenLine xmlns:a14="http://schemas.microsoft.com/office/drawing/2010/main" xmlns="" w="9525">
                   <a:solidFill>
                     <a:srgbClr val="000000"/>
                   </a:solidFill>
@@ -871,7 +873,7 @@
             </a:ln>
             <a:extLst>
               <a:ext uri="{91240B29-F687-4f45-9708-019B960494DF}">
-                <a14:hiddenLine xmlns="" xmlns:a14="http://schemas.microsoft.com/office/drawing/2010/main" w="9525">
+                <a14:hiddenLine xmlns:a14="http://schemas.microsoft.com/office/drawing/2010/main" xmlns="" w="9525">
                   <a:solidFill>
                     <a:srgbClr val="000000"/>
                   </a:solidFill>
@@ -961,7 +963,7 @@
             </a:ln>
             <a:extLst>
               <a:ext uri="{91240B29-F687-4f45-9708-019B960494DF}">
-                <a14:hiddenLine xmlns="" xmlns:a14="http://schemas.microsoft.com/office/drawing/2010/main" w="9525">
+                <a14:hiddenLine xmlns:a14="http://schemas.microsoft.com/office/drawing/2010/main" xmlns="" w="9525">
                   <a:solidFill>
                     <a:srgbClr val="000000"/>
                   </a:solidFill>
@@ -1051,7 +1053,7 @@
             </a:ln>
             <a:extLst>
               <a:ext uri="{91240B29-F687-4f45-9708-019B960494DF}">
-                <a14:hiddenLine xmlns="" xmlns:a14="http://schemas.microsoft.com/office/drawing/2010/main" w="9525">
+                <a14:hiddenLine xmlns:a14="http://schemas.microsoft.com/office/drawing/2010/main" xmlns="" w="9525">
                   <a:solidFill>
                     <a:srgbClr val="000000"/>
                   </a:solidFill>
@@ -1113,7 +1115,7 @@
             </a:ln>
             <a:extLst>
               <a:ext uri="{91240B29-F687-4f45-9708-019B960494DF}">
-                <a14:hiddenLine xmlns="" xmlns:a14="http://schemas.microsoft.com/office/drawing/2010/main" w="9525">
+                <a14:hiddenLine xmlns:a14="http://schemas.microsoft.com/office/drawing/2010/main" xmlns="" w="9525">
                   <a:solidFill>
                     <a:srgbClr val="000000"/>
                   </a:solidFill>
@@ -1223,7 +1225,7 @@
             </a:ln>
             <a:extLst>
               <a:ext uri="{91240B29-F687-4f45-9708-019B960494DF}">
-                <a14:hiddenLine xmlns="" xmlns:a14="http://schemas.microsoft.com/office/drawing/2010/main" w="9525">
+                <a14:hiddenLine xmlns:a14="http://schemas.microsoft.com/office/drawing/2010/main" xmlns="" w="9525">
                   <a:solidFill>
                     <a:srgbClr val="000000"/>
                   </a:solidFill>
@@ -1285,7 +1287,7 @@
             </a:ln>
             <a:extLst>
               <a:ext uri="{91240B29-F687-4f45-9708-019B960494DF}">
-                <a14:hiddenLine xmlns="" xmlns:a14="http://schemas.microsoft.com/office/drawing/2010/main" w="9525">
+                <a14:hiddenLine xmlns:a14="http://schemas.microsoft.com/office/drawing/2010/main" xmlns="" w="9525">
                   <a:solidFill>
                     <a:srgbClr val="000000"/>
                   </a:solidFill>
@@ -1375,7 +1377,7 @@
             </a:ln>
             <a:extLst>
               <a:ext uri="{91240B29-F687-4f45-9708-019B960494DF}">
-                <a14:hiddenLine xmlns="" xmlns:a14="http://schemas.microsoft.com/office/drawing/2010/main" w="9525">
+                <a14:hiddenLine xmlns:a14="http://schemas.microsoft.com/office/drawing/2010/main" xmlns="" w="9525">
                   <a:solidFill>
                     <a:srgbClr val="000000"/>
                   </a:solidFill>
@@ -1465,7 +1467,7 @@
             </a:ln>
             <a:extLst>
               <a:ext uri="{91240B29-F687-4f45-9708-019B960494DF}">
-                <a14:hiddenLine xmlns="" xmlns:a14="http://schemas.microsoft.com/office/drawing/2010/main" w="9525">
+                <a14:hiddenLine xmlns:a14="http://schemas.microsoft.com/office/drawing/2010/main" xmlns="" w="9525">
                   <a:solidFill>
                     <a:srgbClr val="000000"/>
                   </a:solidFill>
@@ -1527,7 +1529,7 @@
             </a:ln>
             <a:extLst>
               <a:ext uri="{91240B29-F687-4f45-9708-019B960494DF}">
-                <a14:hiddenLine xmlns="" xmlns:a14="http://schemas.microsoft.com/office/drawing/2010/main" w="9525">
+                <a14:hiddenLine xmlns:a14="http://schemas.microsoft.com/office/drawing/2010/main" xmlns="" w="9525">
                   <a:solidFill>
                     <a:srgbClr val="000000"/>
                   </a:solidFill>
@@ -1617,7 +1619,7 @@
             </a:ln>
             <a:extLst>
               <a:ext uri="{91240B29-F687-4f45-9708-019B960494DF}">
-                <a14:hiddenLine xmlns="" xmlns:a14="http://schemas.microsoft.com/office/drawing/2010/main" w="9525">
+                <a14:hiddenLine xmlns:a14="http://schemas.microsoft.com/office/drawing/2010/main" xmlns="" w="9525">
                   <a:solidFill>
                     <a:srgbClr val="000000"/>
                   </a:solidFill>
@@ -1707,7 +1709,7 @@
             </a:ln>
             <a:extLst>
               <a:ext uri="{91240B29-F687-4f45-9708-019B960494DF}">
-                <a14:hiddenLine xmlns="" xmlns:a14="http://schemas.microsoft.com/office/drawing/2010/main" w="9525">
+                <a14:hiddenLine xmlns:a14="http://schemas.microsoft.com/office/drawing/2010/main" xmlns="" w="9525">
                   <a:solidFill>
                     <a:srgbClr val="000000"/>
                   </a:solidFill>
@@ -1763,7 +1765,7 @@
             </a:ln>
             <a:extLst>
               <a:ext uri="{91240B29-F687-4f45-9708-019B960494DF}">
-                <a14:hiddenLine xmlns="" xmlns:a14="http://schemas.microsoft.com/office/drawing/2010/main" w="9525">
+                <a14:hiddenLine xmlns:a14="http://schemas.microsoft.com/office/drawing/2010/main" xmlns="" w="9525">
                   <a:solidFill>
                     <a:srgbClr val="000000"/>
                   </a:solidFill>
@@ -1853,7 +1855,7 @@
             </a:ln>
             <a:extLst>
               <a:ext uri="{91240B29-F687-4f45-9708-019B960494DF}">
-                <a14:hiddenLine xmlns="" xmlns:a14="http://schemas.microsoft.com/office/drawing/2010/main" w="9525">
+                <a14:hiddenLine xmlns:a14="http://schemas.microsoft.com/office/drawing/2010/main" xmlns="" w="9525">
                   <a:solidFill>
                     <a:srgbClr val="000000"/>
                   </a:solidFill>
@@ -1909,7 +1911,7 @@
             </a:ln>
             <a:extLst>
               <a:ext uri="{91240B29-F687-4f45-9708-019B960494DF}">
-                <a14:hiddenLine xmlns="" xmlns:a14="http://schemas.microsoft.com/office/drawing/2010/main" w="9525">
+                <a14:hiddenLine xmlns:a14="http://schemas.microsoft.com/office/drawing/2010/main" xmlns="" w="9525">
                   <a:solidFill>
                     <a:srgbClr val="000000"/>
                   </a:solidFill>
@@ -1999,7 +2001,7 @@
             </a:ln>
             <a:extLst>
               <a:ext uri="{91240B29-F687-4f45-9708-019B960494DF}">
-                <a14:hiddenLine xmlns="" xmlns:a14="http://schemas.microsoft.com/office/drawing/2010/main" w="9525">
+                <a14:hiddenLine xmlns:a14="http://schemas.microsoft.com/office/drawing/2010/main" xmlns="" w="9525">
                   <a:solidFill>
                     <a:srgbClr val="000000"/>
                   </a:solidFill>
@@ -2067,7 +2069,7 @@
             </a:ln>
             <a:extLst>
               <a:ext uri="{91240B29-F687-4f45-9708-019B960494DF}">
-                <a14:hiddenLine xmlns="" xmlns:a14="http://schemas.microsoft.com/office/drawing/2010/main" w="9525">
+                <a14:hiddenLine xmlns:a14="http://schemas.microsoft.com/office/drawing/2010/main" xmlns="" w="9525">
                   <a:solidFill>
                     <a:srgbClr val="000000"/>
                   </a:solidFill>
@@ -2157,7 +2159,7 @@
             </a:ln>
             <a:extLst>
               <a:ext uri="{91240B29-F687-4f45-9708-019B960494DF}">
-                <a14:hiddenLine xmlns="" xmlns:a14="http://schemas.microsoft.com/office/drawing/2010/main" w="9525">
+                <a14:hiddenLine xmlns:a14="http://schemas.microsoft.com/office/drawing/2010/main" xmlns="" w="9525">
                   <a:solidFill>
                     <a:srgbClr val="000000"/>
                   </a:solidFill>
@@ -2225,7 +2227,7 @@
             </a:ln>
             <a:extLst>
               <a:ext uri="{91240B29-F687-4f45-9708-019B960494DF}">
-                <a14:hiddenLine xmlns="" xmlns:a14="http://schemas.microsoft.com/office/drawing/2010/main" w="9525">
+                <a14:hiddenLine xmlns:a14="http://schemas.microsoft.com/office/drawing/2010/main" xmlns="" w="9525">
                   <a:solidFill>
                     <a:srgbClr val="000000"/>
                   </a:solidFill>
@@ -2315,7 +2317,7 @@
             </a:ln>
             <a:extLst>
               <a:ext uri="{91240B29-F687-4f45-9708-019B960494DF}">
-                <a14:hiddenLine xmlns="" xmlns:a14="http://schemas.microsoft.com/office/drawing/2010/main" w="9525">
+                <a14:hiddenLine xmlns:a14="http://schemas.microsoft.com/office/drawing/2010/main" xmlns="" w="9525">
                   <a:solidFill>
                     <a:srgbClr val="000000"/>
                   </a:solidFill>
@@ -2349,7 +2351,7 @@
             </a:ln>
             <a:extLst>
               <a:ext uri="{91240B29-F687-4f45-9708-019B960494DF}">
-                <a14:hiddenLine xmlns="" xmlns:a14="http://schemas.microsoft.com/office/drawing/2010/main" w="9525">
+                <a14:hiddenLine xmlns:a14="http://schemas.microsoft.com/office/drawing/2010/main" xmlns="" w="9525">
                   <a:solidFill>
                     <a:srgbClr val="000000"/>
                   </a:solidFill>
@@ -2439,7 +2441,7 @@
             </a:ln>
             <a:extLst>
               <a:ext uri="{91240B29-F687-4f45-9708-019B960494DF}">
-                <a14:hiddenLine xmlns="" xmlns:a14="http://schemas.microsoft.com/office/drawing/2010/main" w="9525">
+                <a14:hiddenLine xmlns:a14="http://schemas.microsoft.com/office/drawing/2010/main" xmlns="" w="9525">
                   <a:solidFill>
                     <a:srgbClr val="000000"/>
                   </a:solidFill>
@@ -2501,7 +2503,7 @@
             </a:ln>
             <a:extLst>
               <a:ext uri="{91240B29-F687-4f45-9708-019B960494DF}">
-                <a14:hiddenLine xmlns="" xmlns:a14="http://schemas.microsoft.com/office/drawing/2010/main" w="9525">
+                <a14:hiddenLine xmlns:a14="http://schemas.microsoft.com/office/drawing/2010/main" xmlns="" w="9525">
                   <a:solidFill>
                     <a:srgbClr val="000000"/>
                   </a:solidFill>
@@ -2563,7 +2565,7 @@
             </a:ln>
             <a:extLst>
               <a:ext uri="{91240B29-F687-4f45-9708-019B960494DF}">
-                <a14:hiddenLine xmlns="" xmlns:a14="http://schemas.microsoft.com/office/drawing/2010/main" w="9525">
+                <a14:hiddenLine xmlns:a14="http://schemas.microsoft.com/office/drawing/2010/main" xmlns="" w="9525">
                   <a:solidFill>
                     <a:srgbClr val="000000"/>
                   </a:solidFill>
@@ -2653,7 +2655,7 @@
             </a:ln>
             <a:extLst>
               <a:ext uri="{91240B29-F687-4f45-9708-019B960494DF}">
-                <a14:hiddenLine xmlns="" xmlns:a14="http://schemas.microsoft.com/office/drawing/2010/main" w="9525">
+                <a14:hiddenLine xmlns:a14="http://schemas.microsoft.com/office/drawing/2010/main" xmlns="" w="9525">
                   <a:solidFill>
                     <a:srgbClr val="000000"/>
                   </a:solidFill>
@@ -2721,7 +2723,7 @@
             </a:ln>
             <a:extLst>
               <a:ext uri="{91240B29-F687-4f45-9708-019B960494DF}">
-                <a14:hiddenLine xmlns="" xmlns:a14="http://schemas.microsoft.com/office/drawing/2010/main" w="9525">
+                <a14:hiddenLine xmlns:a14="http://schemas.microsoft.com/office/drawing/2010/main" xmlns="" w="9525">
                   <a:solidFill>
                     <a:srgbClr val="000000"/>
                   </a:solidFill>
@@ -2783,7 +2785,7 @@
             </a:ln>
             <a:extLst>
               <a:ext uri="{91240B29-F687-4f45-9708-019B960494DF}">
-                <a14:hiddenLine xmlns="" xmlns:a14="http://schemas.microsoft.com/office/drawing/2010/main" w="9525">
+                <a14:hiddenLine xmlns:a14="http://schemas.microsoft.com/office/drawing/2010/main" xmlns="" w="9525">
                   <a:solidFill>
                     <a:srgbClr val="000000"/>
                   </a:solidFill>
@@ -2873,7 +2875,7 @@
             </a:ln>
             <a:extLst>
               <a:ext uri="{91240B29-F687-4f45-9708-019B960494DF}">
-                <a14:hiddenLine xmlns="" xmlns:a14="http://schemas.microsoft.com/office/drawing/2010/main" w="9525">
+                <a14:hiddenLine xmlns:a14="http://schemas.microsoft.com/office/drawing/2010/main" xmlns="" w="9525">
                   <a:solidFill>
                     <a:srgbClr val="000000"/>
                   </a:solidFill>
@@ -2935,7 +2937,7 @@
             </a:ln>
             <a:extLst>
               <a:ext uri="{91240B29-F687-4f45-9708-019B960494DF}">
-                <a14:hiddenLine xmlns="" xmlns:a14="http://schemas.microsoft.com/office/drawing/2010/main" w="9525">
+                <a14:hiddenLine xmlns:a14="http://schemas.microsoft.com/office/drawing/2010/main" xmlns="" w="9525">
                   <a:solidFill>
                     <a:srgbClr val="000000"/>
                   </a:solidFill>
@@ -3025,7 +3027,7 @@
             </a:ln>
             <a:extLst>
               <a:ext uri="{91240B29-F687-4f45-9708-019B960494DF}">
-                <a14:hiddenLine xmlns="" xmlns:a14="http://schemas.microsoft.com/office/drawing/2010/main" w="9525">
+                <a14:hiddenLine xmlns:a14="http://schemas.microsoft.com/office/drawing/2010/main" xmlns="" w="9525">
                   <a:solidFill>
                     <a:srgbClr val="000000"/>
                   </a:solidFill>
@@ -3087,7 +3089,7 @@
             </a:ln>
             <a:extLst>
               <a:ext uri="{91240B29-F687-4f45-9708-019B960494DF}">
-                <a14:hiddenLine xmlns="" xmlns:a14="http://schemas.microsoft.com/office/drawing/2010/main" w="9525">
+                <a14:hiddenLine xmlns:a14="http://schemas.microsoft.com/office/drawing/2010/main" xmlns="" w="9525">
                   <a:solidFill>
                     <a:srgbClr val="000000"/>
                   </a:solidFill>
@@ -3177,7 +3179,7 @@
             </a:ln>
             <a:extLst>
               <a:ext uri="{91240B29-F687-4f45-9708-019B960494DF}">
-                <a14:hiddenLine xmlns="" xmlns:a14="http://schemas.microsoft.com/office/drawing/2010/main" w="9525">
+                <a14:hiddenLine xmlns:a14="http://schemas.microsoft.com/office/drawing/2010/main" xmlns="" w="9525">
                   <a:solidFill>
                     <a:srgbClr val="000000"/>
                   </a:solidFill>
@@ -3211,7 +3213,7 @@
             </a:ln>
             <a:extLst>
               <a:ext uri="{91240B29-F687-4f45-9708-019B960494DF}">
-                <a14:hiddenLine xmlns="" xmlns:a14="http://schemas.microsoft.com/office/drawing/2010/main" w="9525">
+                <a14:hiddenLine xmlns:a14="http://schemas.microsoft.com/office/drawing/2010/main" xmlns="" w="9525">
                   <a:solidFill>
                     <a:srgbClr val="000000"/>
                   </a:solidFill>
@@ -3276,7 +3278,7 @@
             </a:ln>
             <a:extLst>
               <a:ext uri="{91240B29-F687-4f45-9708-019B960494DF}">
-                <a14:hiddenLine xmlns="" xmlns:a14="http://schemas.microsoft.com/office/drawing/2010/main" w="9525">
+                <a14:hiddenLine xmlns:a14="http://schemas.microsoft.com/office/drawing/2010/main" xmlns="" w="9525">
                   <a:solidFill>
                     <a:srgbClr val="000000"/>
                   </a:solidFill>
@@ -3366,7 +3368,7 @@
             </a:ln>
             <a:extLst>
               <a:ext uri="{91240B29-F687-4f45-9708-019B960494DF}">
-                <a14:hiddenLine xmlns="" xmlns:a14="http://schemas.microsoft.com/office/drawing/2010/main" w="9525">
+                <a14:hiddenLine xmlns:a14="http://schemas.microsoft.com/office/drawing/2010/main" xmlns="" w="9525">
                   <a:solidFill>
                     <a:srgbClr val="000000"/>
                   </a:solidFill>
@@ -3428,7 +3430,7 @@
             </a:ln>
             <a:extLst>
               <a:ext uri="{91240B29-F687-4f45-9708-019B960494DF}">
-                <a14:hiddenLine xmlns="" xmlns:a14="http://schemas.microsoft.com/office/drawing/2010/main" w="9525">
+                <a14:hiddenLine xmlns:a14="http://schemas.microsoft.com/office/drawing/2010/main" xmlns="" w="9525">
                   <a:solidFill>
                     <a:srgbClr val="000000"/>
                   </a:solidFill>
@@ -3518,7 +3520,7 @@
             </a:ln>
             <a:extLst>
               <a:ext uri="{91240B29-F687-4f45-9708-019B960494DF}">
-                <a14:hiddenLine xmlns="" xmlns:a14="http://schemas.microsoft.com/office/drawing/2010/main" w="9525">
+                <a14:hiddenLine xmlns:a14="http://schemas.microsoft.com/office/drawing/2010/main" xmlns="" w="9525">
                   <a:solidFill>
                     <a:srgbClr val="000000"/>
                   </a:solidFill>
@@ -3608,7 +3610,7 @@
             </a:ln>
             <a:extLst>
               <a:ext uri="{91240B29-F687-4f45-9708-019B960494DF}">
-                <a14:hiddenLine xmlns="" xmlns:a14="http://schemas.microsoft.com/office/drawing/2010/main" w="9525">
+                <a14:hiddenLine xmlns:a14="http://schemas.microsoft.com/office/drawing/2010/main" xmlns="" w="9525">
                   <a:solidFill>
                     <a:srgbClr val="000000"/>
                   </a:solidFill>
@@ -3673,7 +3675,7 @@
             </a:ln>
             <a:extLst>
               <a:ext uri="{91240B29-F687-4f45-9708-019B960494DF}">
-                <a14:hiddenLine xmlns="" xmlns:a14="http://schemas.microsoft.com/office/drawing/2010/main" w="9525">
+                <a14:hiddenLine xmlns:a14="http://schemas.microsoft.com/office/drawing/2010/main" xmlns="" w="9525">
                   <a:solidFill>
                     <a:srgbClr val="000000"/>
                   </a:solidFill>
@@ -3735,7 +3737,7 @@
             </a:ln>
             <a:extLst>
               <a:ext uri="{91240B29-F687-4f45-9708-019B960494DF}">
-                <a14:hiddenLine xmlns="" xmlns:a14="http://schemas.microsoft.com/office/drawing/2010/main" w="9525">
+                <a14:hiddenLine xmlns:a14="http://schemas.microsoft.com/office/drawing/2010/main" xmlns="" w="9525">
                   <a:solidFill>
                     <a:srgbClr val="000000"/>
                   </a:solidFill>
@@ -3825,7 +3827,7 @@
             </a:ln>
             <a:extLst>
               <a:ext uri="{91240B29-F687-4f45-9708-019B960494DF}">
-                <a14:hiddenLine xmlns="" xmlns:a14="http://schemas.microsoft.com/office/drawing/2010/main" w="9525">
+                <a14:hiddenLine xmlns:a14="http://schemas.microsoft.com/office/drawing/2010/main" xmlns="" w="9525">
                   <a:solidFill>
                     <a:srgbClr val="000000"/>
                   </a:solidFill>
@@ -3915,7 +3917,7 @@
             </a:ln>
             <a:extLst>
               <a:ext uri="{91240B29-F687-4f45-9708-019B960494DF}">
-                <a14:hiddenLine xmlns="" xmlns:a14="http://schemas.microsoft.com/office/drawing/2010/main" w="9525">
+                <a14:hiddenLine xmlns:a14="http://schemas.microsoft.com/office/drawing/2010/main" xmlns="" w="9525">
                   <a:solidFill>
                     <a:srgbClr val="000000"/>
                   </a:solidFill>
@@ -3977,7 +3979,7 @@
             </a:ln>
             <a:extLst>
               <a:ext uri="{91240B29-F687-4f45-9708-019B960494DF}">
-                <a14:hiddenLine xmlns="" xmlns:a14="http://schemas.microsoft.com/office/drawing/2010/main" w="9525">
+                <a14:hiddenLine xmlns:a14="http://schemas.microsoft.com/office/drawing/2010/main" xmlns="" w="9525">
                   <a:solidFill>
                     <a:srgbClr val="000000"/>
                   </a:solidFill>
@@ -4097,7 +4099,7 @@
             </a:ln>
             <a:extLst>
               <a:ext uri="{91240B29-F687-4f45-9708-019B960494DF}">
-                <a14:hiddenLine xmlns="" xmlns:a14="http://schemas.microsoft.com/office/drawing/2010/main" w="9525">
+                <a14:hiddenLine xmlns:a14="http://schemas.microsoft.com/office/drawing/2010/main" xmlns="" w="9525">
                   <a:solidFill>
                     <a:srgbClr val="000000"/>
                   </a:solidFill>
@@ -4165,7 +4167,7 @@
             </a:ln>
             <a:extLst>
               <a:ext uri="{91240B29-F687-4f45-9708-019B960494DF}">
-                <a14:hiddenLine xmlns="" xmlns:a14="http://schemas.microsoft.com/office/drawing/2010/main" w="9525">
+                <a14:hiddenLine xmlns:a14="http://schemas.microsoft.com/office/drawing/2010/main" xmlns="" w="9525">
                   <a:solidFill>
                     <a:srgbClr val="000000"/>
                   </a:solidFill>
@@ -4255,7 +4257,7 @@
             </a:ln>
             <a:extLst>
               <a:ext uri="{91240B29-F687-4f45-9708-019B960494DF}">
-                <a14:hiddenLine xmlns="" xmlns:a14="http://schemas.microsoft.com/office/drawing/2010/main" w="9525">
+                <a14:hiddenLine xmlns:a14="http://schemas.microsoft.com/office/drawing/2010/main" xmlns="" w="9525">
                   <a:solidFill>
                     <a:srgbClr val="000000"/>
                   </a:solidFill>
@@ -4395,7 +4397,7 @@
           <a:p>
             <a:fld id="{48A87A34-81AB-432B-8DAE-1953F412C126}" type="datetimeFigureOut">
               <a:rPr lang="en-US" smtClean="0"/>
-              <a:t>3/31/19</a:t>
+              <a:t>4/1/2019</a:t>
             </a:fld>
             <a:endParaRPr lang="en-US" dirty="0"/>
           </a:p>
@@ -4662,7 +4664,7 @@
           <a:p>
             <a:fld id="{48A87A34-81AB-432B-8DAE-1953F412C126}" type="datetimeFigureOut">
               <a:rPr lang="en-US" smtClean="0"/>
-              <a:t>3/31/19</a:t>
+              <a:t>4/1/2019</a:t>
             </a:fld>
             <a:endParaRPr lang="en-US" dirty="0"/>
           </a:p>
@@ -4858,7 +4860,7 @@
           <a:p>
             <a:fld id="{48A87A34-81AB-432B-8DAE-1953F412C126}" type="datetimeFigureOut">
               <a:rPr lang="en-US" smtClean="0"/>
-              <a:t>3/31/19</a:t>
+              <a:t>4/1/2019</a:t>
             </a:fld>
             <a:endParaRPr lang="en-US" dirty="0"/>
           </a:p>
@@ -5121,7 +5123,7 @@
           <a:p>
             <a:fld id="{48A87A34-81AB-432B-8DAE-1953F412C126}" type="datetimeFigureOut">
               <a:rPr lang="en-US" smtClean="0"/>
-              <a:t>3/31/19</a:t>
+              <a:t>4/1/2019</a:t>
             </a:fld>
             <a:endParaRPr lang="en-US" dirty="0"/>
           </a:p>
@@ -5555,7 +5557,7 @@
           <a:p>
             <a:fld id="{48A87A34-81AB-432B-8DAE-1953F412C126}" type="datetimeFigureOut">
               <a:rPr lang="en-US" smtClean="0"/>
-              <a:t>3/31/19</a:t>
+              <a:t>4/1/2019</a:t>
             </a:fld>
             <a:endParaRPr lang="en-US" dirty="0"/>
           </a:p>
@@ -6101,7 +6103,7 @@
           <a:p>
             <a:fld id="{48A87A34-81AB-432B-8DAE-1953F412C126}" type="datetimeFigureOut">
               <a:rPr lang="en-US" smtClean="0"/>
-              <a:t>3/31/19</a:t>
+              <a:t>4/1/2019</a:t>
             </a:fld>
             <a:endParaRPr lang="en-US" dirty="0"/>
           </a:p>
@@ -6821,7 +6823,7 @@
           <a:p>
             <a:fld id="{48A87A34-81AB-432B-8DAE-1953F412C126}" type="datetimeFigureOut">
               <a:rPr lang="en-US" smtClean="0"/>
-              <a:t>3/31/19</a:t>
+              <a:t>4/1/2019</a:t>
             </a:fld>
             <a:endParaRPr lang="en-US" dirty="0"/>
           </a:p>
@@ -6991,7 +6993,7 @@
           <a:p>
             <a:fld id="{48A87A34-81AB-432B-8DAE-1953F412C126}" type="datetimeFigureOut">
               <a:rPr lang="en-US" smtClean="0"/>
-              <a:t>3/31/19</a:t>
+              <a:t>4/1/2019</a:t>
             </a:fld>
             <a:endParaRPr lang="en-US" dirty="0"/>
           </a:p>
@@ -7171,7 +7173,7 @@
           <a:p>
             <a:fld id="{48A87A34-81AB-432B-8DAE-1953F412C126}" type="datetimeFigureOut">
               <a:rPr lang="en-US" smtClean="0"/>
-              <a:t>3/31/19</a:t>
+              <a:t>4/1/2019</a:t>
             </a:fld>
             <a:endParaRPr lang="en-US" dirty="0"/>
           </a:p>
@@ -7341,7 +7343,7 @@
           <a:p>
             <a:fld id="{48A87A34-81AB-432B-8DAE-1953F412C126}" type="datetimeFigureOut">
               <a:rPr lang="en-US" smtClean="0"/>
-              <a:t>3/31/19</a:t>
+              <a:t>4/1/2019</a:t>
             </a:fld>
             <a:endParaRPr lang="en-US" dirty="0"/>
           </a:p>
@@ -7591,7 +7593,7 @@
           <a:p>
             <a:fld id="{48A87A34-81AB-432B-8DAE-1953F412C126}" type="datetimeFigureOut">
               <a:rPr lang="en-US" smtClean="0"/>
-              <a:t>3/31/19</a:t>
+              <a:t>4/1/2019</a:t>
             </a:fld>
             <a:endParaRPr lang="en-US" dirty="0"/>
           </a:p>
@@ -7823,7 +7825,7 @@
           <a:p>
             <a:fld id="{48A87A34-81AB-432B-8DAE-1953F412C126}" type="datetimeFigureOut">
               <a:rPr lang="en-US" smtClean="0"/>
-              <a:t>3/31/19</a:t>
+              <a:t>4/1/2019</a:t>
             </a:fld>
             <a:endParaRPr lang="en-US" dirty="0"/>
           </a:p>
@@ -8204,7 +8206,7 @@
           <a:p>
             <a:fld id="{48A87A34-81AB-432B-8DAE-1953F412C126}" type="datetimeFigureOut">
               <a:rPr lang="en-US" smtClean="0"/>
-              <a:t>3/31/19</a:t>
+              <a:t>4/1/2019</a:t>
             </a:fld>
             <a:endParaRPr lang="en-US" dirty="0"/>
           </a:p>
@@ -8322,7 +8324,7 @@
           <a:p>
             <a:fld id="{48A87A34-81AB-432B-8DAE-1953F412C126}" type="datetimeFigureOut">
               <a:rPr lang="en-US" smtClean="0"/>
-              <a:t>3/31/19</a:t>
+              <a:t>4/1/2019</a:t>
             </a:fld>
             <a:endParaRPr lang="en-US" dirty="0"/>
           </a:p>
@@ -8417,7 +8419,7 @@
           <a:p>
             <a:fld id="{48A87A34-81AB-432B-8DAE-1953F412C126}" type="datetimeFigureOut">
               <a:rPr lang="en-US" smtClean="0"/>
-              <a:t>3/31/19</a:t>
+              <a:t>4/1/2019</a:t>
             </a:fld>
             <a:endParaRPr lang="en-US" dirty="0"/>
           </a:p>
@@ -8666,7 +8668,7 @@
           <a:p>
             <a:fld id="{48A87A34-81AB-432B-8DAE-1953F412C126}" type="datetimeFigureOut">
               <a:rPr lang="en-US" smtClean="0"/>
-              <a:t>3/31/19</a:t>
+              <a:t>4/1/2019</a:t>
             </a:fld>
             <a:endParaRPr lang="en-US" dirty="0"/>
           </a:p>
@@ -8946,7 +8948,7 @@
           <a:p>
             <a:fld id="{48A87A34-81AB-432B-8DAE-1953F412C126}" type="datetimeFigureOut">
               <a:rPr lang="en-US" smtClean="0"/>
-              <a:t>3/31/19</a:t>
+              <a:t>4/1/2019</a:t>
             </a:fld>
             <a:endParaRPr lang="en-US" dirty="0"/>
           </a:p>
@@ -9062,7 +9064,7 @@
           <a:noFill/>
           <a:extLst>
             <a:ext uri="{909E8E84-426E-40dd-AFC4-6F175D3DCCD1}">
-              <a14:hiddenFill xmlns="" xmlns:a14="http://schemas.microsoft.com/office/drawing/2010/main">
+              <a14:hiddenFill xmlns:a14="http://schemas.microsoft.com/office/drawing/2010/main" xmlns="">
                 <a:solidFill>
                   <a:srgbClr val="FFFFFF"/>
                 </a:solidFill>
@@ -9136,7 +9138,7 @@
               </a:ln>
               <a:extLst>
                 <a:ext uri="{91240B29-F687-4f45-9708-019B960494DF}">
-                  <a14:hiddenLine xmlns="" xmlns:a14="http://schemas.microsoft.com/office/drawing/2010/main" w="9525">
+                  <a14:hiddenLine xmlns:a14="http://schemas.microsoft.com/office/drawing/2010/main" xmlns="" w="9525">
                     <a:solidFill>
                       <a:srgbClr val="000000"/>
                     </a:solidFill>
@@ -9226,7 +9228,7 @@
               </a:ln>
               <a:extLst>
                 <a:ext uri="{91240B29-F687-4f45-9708-019B960494DF}">
-                  <a14:hiddenLine xmlns="" xmlns:a14="http://schemas.microsoft.com/office/drawing/2010/main" w="9525">
+                  <a14:hiddenLine xmlns:a14="http://schemas.microsoft.com/office/drawing/2010/main" xmlns="" w="9525">
                     <a:solidFill>
                       <a:srgbClr val="000000"/>
                     </a:solidFill>
@@ -9316,7 +9318,7 @@
               </a:ln>
               <a:extLst>
                 <a:ext uri="{91240B29-F687-4f45-9708-019B960494DF}">
-                  <a14:hiddenLine xmlns="" xmlns:a14="http://schemas.microsoft.com/office/drawing/2010/main" w="9525">
+                  <a14:hiddenLine xmlns:a14="http://schemas.microsoft.com/office/drawing/2010/main" xmlns="" w="9525">
                     <a:solidFill>
                       <a:srgbClr val="000000"/>
                     </a:solidFill>
@@ -9378,7 +9380,7 @@
               </a:ln>
               <a:extLst>
                 <a:ext uri="{91240B29-F687-4f45-9708-019B960494DF}">
-                  <a14:hiddenLine xmlns="" xmlns:a14="http://schemas.microsoft.com/office/drawing/2010/main" w="9525">
+                  <a14:hiddenLine xmlns:a14="http://schemas.microsoft.com/office/drawing/2010/main" xmlns="" w="9525">
                     <a:solidFill>
                       <a:srgbClr val="000000"/>
                     </a:solidFill>
@@ -9468,7 +9470,7 @@
               </a:ln>
               <a:extLst>
                 <a:ext uri="{91240B29-F687-4f45-9708-019B960494DF}">
-                  <a14:hiddenLine xmlns="" xmlns:a14="http://schemas.microsoft.com/office/drawing/2010/main" w="9525">
+                  <a14:hiddenLine xmlns:a14="http://schemas.microsoft.com/office/drawing/2010/main" xmlns="" w="9525">
                     <a:solidFill>
                       <a:srgbClr val="000000"/>
                     </a:solidFill>
@@ -9530,7 +9532,7 @@
               </a:ln>
               <a:extLst>
                 <a:ext uri="{91240B29-F687-4f45-9708-019B960494DF}">
-                  <a14:hiddenLine xmlns="" xmlns:a14="http://schemas.microsoft.com/office/drawing/2010/main" w="9525">
+                  <a14:hiddenLine xmlns:a14="http://schemas.microsoft.com/office/drawing/2010/main" xmlns="" w="9525">
                     <a:solidFill>
                       <a:srgbClr val="000000"/>
                     </a:solidFill>
@@ -9592,7 +9594,7 @@
               </a:ln>
               <a:extLst>
                 <a:ext uri="{91240B29-F687-4f45-9708-019B960494DF}">
-                  <a14:hiddenLine xmlns="" xmlns:a14="http://schemas.microsoft.com/office/drawing/2010/main" w="9525">
+                  <a14:hiddenLine xmlns:a14="http://schemas.microsoft.com/office/drawing/2010/main" xmlns="" w="9525">
                     <a:solidFill>
                       <a:srgbClr val="000000"/>
                     </a:solidFill>
@@ -9682,7 +9684,7 @@
               </a:ln>
               <a:extLst>
                 <a:ext uri="{91240B29-F687-4f45-9708-019B960494DF}">
-                  <a14:hiddenLine xmlns="" xmlns:a14="http://schemas.microsoft.com/office/drawing/2010/main" w="9525">
+                  <a14:hiddenLine xmlns:a14="http://schemas.microsoft.com/office/drawing/2010/main" xmlns="" w="9525">
                     <a:solidFill>
                       <a:srgbClr val="000000"/>
                     </a:solidFill>
@@ -9772,7 +9774,7 @@
               </a:ln>
               <a:extLst>
                 <a:ext uri="{91240B29-F687-4f45-9708-019B960494DF}">
-                  <a14:hiddenLine xmlns="" xmlns:a14="http://schemas.microsoft.com/office/drawing/2010/main" w="9525">
+                  <a14:hiddenLine xmlns:a14="http://schemas.microsoft.com/office/drawing/2010/main" xmlns="" w="9525">
                     <a:solidFill>
                       <a:srgbClr val="000000"/>
                     </a:solidFill>
@@ -9834,7 +9836,7 @@
               </a:ln>
               <a:extLst>
                 <a:ext uri="{91240B29-F687-4f45-9708-019B960494DF}">
-                  <a14:hiddenLine xmlns="" xmlns:a14="http://schemas.microsoft.com/office/drawing/2010/main" w="9525">
+                  <a14:hiddenLine xmlns:a14="http://schemas.microsoft.com/office/drawing/2010/main" xmlns="" w="9525">
                     <a:solidFill>
                       <a:srgbClr val="000000"/>
                     </a:solidFill>
@@ -9944,7 +9946,7 @@
               </a:ln>
               <a:extLst>
                 <a:ext uri="{91240B29-F687-4f45-9708-019B960494DF}">
-                  <a14:hiddenLine xmlns="" xmlns:a14="http://schemas.microsoft.com/office/drawing/2010/main" w="9525">
+                  <a14:hiddenLine xmlns:a14="http://schemas.microsoft.com/office/drawing/2010/main" xmlns="" w="9525">
                     <a:solidFill>
                       <a:srgbClr val="000000"/>
                     </a:solidFill>
@@ -10028,7 +10030,7 @@
               </a:ln>
               <a:extLst>
                 <a:ext uri="{91240B29-F687-4f45-9708-019B960494DF}">
-                  <a14:hiddenLine xmlns="" xmlns:a14="http://schemas.microsoft.com/office/drawing/2010/main" w="9525">
+                  <a14:hiddenLine xmlns:a14="http://schemas.microsoft.com/office/drawing/2010/main" xmlns="" w="9525">
                     <a:solidFill>
                       <a:srgbClr val="000000"/>
                     </a:solidFill>
@@ -10090,7 +10092,7 @@
               </a:ln>
               <a:extLst>
                 <a:ext uri="{91240B29-F687-4f45-9708-019B960494DF}">
-                  <a14:hiddenLine xmlns="" xmlns:a14="http://schemas.microsoft.com/office/drawing/2010/main" w="9525">
+                  <a14:hiddenLine xmlns:a14="http://schemas.microsoft.com/office/drawing/2010/main" xmlns="" w="9525">
                     <a:solidFill>
                       <a:srgbClr val="000000"/>
                     </a:solidFill>
@@ -10152,7 +10154,7 @@
               </a:ln>
               <a:extLst>
                 <a:ext uri="{91240B29-F687-4f45-9708-019B960494DF}">
-                  <a14:hiddenLine xmlns="" xmlns:a14="http://schemas.microsoft.com/office/drawing/2010/main" w="9525">
+                  <a14:hiddenLine xmlns:a14="http://schemas.microsoft.com/office/drawing/2010/main" xmlns="" w="9525">
                     <a:solidFill>
                       <a:srgbClr val="000000"/>
                     </a:solidFill>
@@ -10242,7 +10244,7 @@
               </a:ln>
               <a:extLst>
                 <a:ext uri="{91240B29-F687-4f45-9708-019B960494DF}">
-                  <a14:hiddenLine xmlns="" xmlns:a14="http://schemas.microsoft.com/office/drawing/2010/main" w="9525">
+                  <a14:hiddenLine xmlns:a14="http://schemas.microsoft.com/office/drawing/2010/main" xmlns="" w="9525">
                     <a:solidFill>
                       <a:srgbClr val="000000"/>
                     </a:solidFill>
@@ -10276,7 +10278,7 @@
               </a:ln>
               <a:extLst>
                 <a:ext uri="{91240B29-F687-4f45-9708-019B960494DF}">
-                  <a14:hiddenLine xmlns="" xmlns:a14="http://schemas.microsoft.com/office/drawing/2010/main" w="9525">
+                  <a14:hiddenLine xmlns:a14="http://schemas.microsoft.com/office/drawing/2010/main" xmlns="" w="9525">
                     <a:solidFill>
                       <a:srgbClr val="000000"/>
                     </a:solidFill>
@@ -10341,7 +10343,7 @@
               </a:ln>
               <a:extLst>
                 <a:ext uri="{91240B29-F687-4f45-9708-019B960494DF}">
-                  <a14:hiddenLine xmlns="" xmlns:a14="http://schemas.microsoft.com/office/drawing/2010/main" w="9525">
+                  <a14:hiddenLine xmlns:a14="http://schemas.microsoft.com/office/drawing/2010/main" xmlns="" w="9525">
                     <a:solidFill>
                       <a:srgbClr val="000000"/>
                     </a:solidFill>
@@ -10431,7 +10433,7 @@
               </a:ln>
               <a:extLst>
                 <a:ext uri="{91240B29-F687-4f45-9708-019B960494DF}">
-                  <a14:hiddenLine xmlns="" xmlns:a14="http://schemas.microsoft.com/office/drawing/2010/main" w="9525">
+                  <a14:hiddenLine xmlns:a14="http://schemas.microsoft.com/office/drawing/2010/main" xmlns="" w="9525">
                     <a:solidFill>
                       <a:srgbClr val="000000"/>
                     </a:solidFill>
@@ -10493,7 +10495,7 @@
               </a:ln>
               <a:extLst>
                 <a:ext uri="{91240B29-F687-4f45-9708-019B960494DF}">
-                  <a14:hiddenLine xmlns="" xmlns:a14="http://schemas.microsoft.com/office/drawing/2010/main" w="9525">
+                  <a14:hiddenLine xmlns:a14="http://schemas.microsoft.com/office/drawing/2010/main" xmlns="" w="9525">
                     <a:solidFill>
                       <a:srgbClr val="000000"/>
                     </a:solidFill>
@@ -10583,7 +10585,7 @@
               </a:ln>
               <a:extLst>
                 <a:ext uri="{91240B29-F687-4f45-9708-019B960494DF}">
-                  <a14:hiddenLine xmlns="" xmlns:a14="http://schemas.microsoft.com/office/drawing/2010/main" w="9525">
+                  <a14:hiddenLine xmlns:a14="http://schemas.microsoft.com/office/drawing/2010/main" xmlns="" w="9525">
                     <a:solidFill>
                       <a:srgbClr val="000000"/>
                     </a:solidFill>
@@ -10648,7 +10650,7 @@
               </a:ln>
               <a:extLst>
                 <a:ext uri="{91240B29-F687-4f45-9708-019B960494DF}">
-                  <a14:hiddenLine xmlns="" xmlns:a14="http://schemas.microsoft.com/office/drawing/2010/main" w="9525">
+                  <a14:hiddenLine xmlns:a14="http://schemas.microsoft.com/office/drawing/2010/main" xmlns="" w="9525">
                     <a:solidFill>
                       <a:srgbClr val="000000"/>
                     </a:solidFill>
@@ -10710,7 +10712,7 @@
               </a:ln>
               <a:extLst>
                 <a:ext uri="{91240B29-F687-4f45-9708-019B960494DF}">
-                  <a14:hiddenLine xmlns="" xmlns:a14="http://schemas.microsoft.com/office/drawing/2010/main" w="9525">
+                  <a14:hiddenLine xmlns:a14="http://schemas.microsoft.com/office/drawing/2010/main" xmlns="" w="9525">
                     <a:solidFill>
                       <a:srgbClr val="000000"/>
                     </a:solidFill>
@@ -10800,7 +10802,7 @@
               </a:ln>
               <a:extLst>
                 <a:ext uri="{91240B29-F687-4f45-9708-019B960494DF}">
-                  <a14:hiddenLine xmlns="" xmlns:a14="http://schemas.microsoft.com/office/drawing/2010/main" w="9525">
+                  <a14:hiddenLine xmlns:a14="http://schemas.microsoft.com/office/drawing/2010/main" xmlns="" w="9525">
                     <a:solidFill>
                       <a:srgbClr val="000000"/>
                     </a:solidFill>
@@ -10890,7 +10892,7 @@
               </a:ln>
               <a:extLst>
                 <a:ext uri="{91240B29-F687-4f45-9708-019B960494DF}">
-                  <a14:hiddenLine xmlns="" xmlns:a14="http://schemas.microsoft.com/office/drawing/2010/main" w="9525">
+                  <a14:hiddenLine xmlns:a14="http://schemas.microsoft.com/office/drawing/2010/main" xmlns="" w="9525">
                     <a:solidFill>
                       <a:srgbClr val="000000"/>
                     </a:solidFill>
@@ -10955,7 +10957,7 @@
               </a:ln>
               <a:extLst>
                 <a:ext uri="{91240B29-F687-4f45-9708-019B960494DF}">
-                  <a14:hiddenLine xmlns="" xmlns:a14="http://schemas.microsoft.com/office/drawing/2010/main" w="9525">
+                  <a14:hiddenLine xmlns:a14="http://schemas.microsoft.com/office/drawing/2010/main" xmlns="" w="9525">
                     <a:solidFill>
                       <a:srgbClr val="000000"/>
                     </a:solidFill>
@@ -11075,7 +11077,7 @@
               </a:ln>
               <a:extLst>
                 <a:ext uri="{91240B29-F687-4f45-9708-019B960494DF}">
-                  <a14:hiddenLine xmlns="" xmlns:a14="http://schemas.microsoft.com/office/drawing/2010/main" w="9525">
+                  <a14:hiddenLine xmlns:a14="http://schemas.microsoft.com/office/drawing/2010/main" xmlns="" w="9525">
                     <a:solidFill>
                       <a:srgbClr val="000000"/>
                     </a:solidFill>
@@ -11173,7 +11175,7 @@
               </a:ln>
               <a:extLst>
                 <a:ext uri="{91240B29-F687-4f45-9708-019B960494DF}">
-                  <a14:hiddenLine xmlns="" xmlns:a14="http://schemas.microsoft.com/office/drawing/2010/main" w="9525">
+                  <a14:hiddenLine xmlns:a14="http://schemas.microsoft.com/office/drawing/2010/main" xmlns="" w="9525">
                     <a:solidFill>
                       <a:srgbClr val="000000"/>
                     </a:solidFill>
@@ -11288,7 +11290,7 @@
               </a:ln>
               <a:extLst>
                 <a:ext uri="{91240B29-F687-4f45-9708-019B960494DF}">
-                  <a14:hiddenLine xmlns="" xmlns:a14="http://schemas.microsoft.com/office/drawing/2010/main" w="9525">
+                  <a14:hiddenLine xmlns:a14="http://schemas.microsoft.com/office/drawing/2010/main" xmlns="" w="9525">
                     <a:solidFill>
                       <a:srgbClr val="000000"/>
                     </a:solidFill>
@@ -11378,7 +11380,7 @@
               </a:ln>
               <a:extLst>
                 <a:ext uri="{91240B29-F687-4f45-9708-019B960494DF}">
-                  <a14:hiddenLine xmlns="" xmlns:a14="http://schemas.microsoft.com/office/drawing/2010/main" w="9525">
+                  <a14:hiddenLine xmlns:a14="http://schemas.microsoft.com/office/drawing/2010/main" xmlns="" w="9525">
                     <a:solidFill>
                       <a:srgbClr val="000000"/>
                     </a:solidFill>
@@ -11443,7 +11445,7 @@
               </a:ln>
               <a:extLst>
                 <a:ext uri="{91240B29-F687-4f45-9708-019B960494DF}">
-                  <a14:hiddenLine xmlns="" xmlns:a14="http://schemas.microsoft.com/office/drawing/2010/main" w="9525">
+                  <a14:hiddenLine xmlns:a14="http://schemas.microsoft.com/office/drawing/2010/main" xmlns="" w="9525">
                     <a:solidFill>
                       <a:srgbClr val="000000"/>
                     </a:solidFill>
@@ -11533,7 +11535,7 @@
               </a:ln>
               <a:extLst>
                 <a:ext uri="{91240B29-F687-4f45-9708-019B960494DF}">
-                  <a14:hiddenLine xmlns="" xmlns:a14="http://schemas.microsoft.com/office/drawing/2010/main" w="9525">
+                  <a14:hiddenLine xmlns:a14="http://schemas.microsoft.com/office/drawing/2010/main" xmlns="" w="9525">
                     <a:solidFill>
                       <a:srgbClr val="000000"/>
                     </a:solidFill>
@@ -11601,7 +11603,7 @@
               </a:ln>
               <a:extLst>
                 <a:ext uri="{91240B29-F687-4f45-9708-019B960494DF}">
-                  <a14:hiddenLine xmlns="" xmlns:a14="http://schemas.microsoft.com/office/drawing/2010/main" w="9525">
+                  <a14:hiddenLine xmlns:a14="http://schemas.microsoft.com/office/drawing/2010/main" xmlns="" w="9525">
                     <a:solidFill>
                       <a:srgbClr val="000000"/>
                     </a:solidFill>
@@ -11691,7 +11693,7 @@
               </a:ln>
               <a:extLst>
                 <a:ext uri="{91240B29-F687-4f45-9708-019B960494DF}">
-                  <a14:hiddenLine xmlns="" xmlns:a14="http://schemas.microsoft.com/office/drawing/2010/main" w="9525">
+                  <a14:hiddenLine xmlns:a14="http://schemas.microsoft.com/office/drawing/2010/main" xmlns="" w="9525">
                     <a:solidFill>
                       <a:srgbClr val="000000"/>
                     </a:solidFill>
@@ -11759,7 +11761,7 @@
               </a:ln>
               <a:extLst>
                 <a:ext uri="{91240B29-F687-4f45-9708-019B960494DF}">
-                  <a14:hiddenLine xmlns="" xmlns:a14="http://schemas.microsoft.com/office/drawing/2010/main" w="9525">
+                  <a14:hiddenLine xmlns:a14="http://schemas.microsoft.com/office/drawing/2010/main" xmlns="" w="9525">
                     <a:solidFill>
                       <a:srgbClr val="000000"/>
                     </a:solidFill>
@@ -11849,7 +11851,7 @@
               </a:ln>
               <a:extLst>
                 <a:ext uri="{91240B29-F687-4f45-9708-019B960494DF}">
-                  <a14:hiddenLine xmlns="" xmlns:a14="http://schemas.microsoft.com/office/drawing/2010/main" w="9525">
+                  <a14:hiddenLine xmlns:a14="http://schemas.microsoft.com/office/drawing/2010/main" xmlns="" w="9525">
                     <a:solidFill>
                       <a:srgbClr val="000000"/>
                     </a:solidFill>
@@ -11883,7 +11885,7 @@
               </a:ln>
               <a:extLst>
                 <a:ext uri="{91240B29-F687-4f45-9708-019B960494DF}">
-                  <a14:hiddenLine xmlns="" xmlns:a14="http://schemas.microsoft.com/office/drawing/2010/main" w="9525">
+                  <a14:hiddenLine xmlns:a14="http://schemas.microsoft.com/office/drawing/2010/main" xmlns="" w="9525">
                     <a:solidFill>
                       <a:srgbClr val="000000"/>
                     </a:solidFill>
@@ -12024,7 +12026,7 @@
             <a:fld id="{48A87A34-81AB-432B-8DAE-1953F412C126}" type="datetimeFigureOut">
               <a:rPr lang="en-US" smtClean="0"/>
               <a:pPr/>
-              <a:t>3/31/19</a:t>
+              <a:t>4/1/2019</a:t>
             </a:fld>
             <a:endParaRPr lang="en-US" dirty="0"/>
           </a:p>
@@ -12463,7 +12465,7 @@
         </p:nvSpPr>
         <p:spPr>
           <a:xfrm>
-            <a:off x="1876424" y="1028699"/>
+            <a:off x="1883611" y="200818"/>
             <a:ext cx="8791575" cy="931863"/>
           </a:xfrm>
         </p:spPr>
@@ -12497,8 +12499,8 @@
         </p:nvSpPr>
         <p:spPr>
           <a:xfrm>
-            <a:off x="2155823" y="5001420"/>
-            <a:ext cx="9896477" cy="1655762"/>
+            <a:off x="2385391" y="5001420"/>
+            <a:ext cx="9666909" cy="1655762"/>
           </a:xfrm>
         </p:spPr>
         <p:txBody>
@@ -12568,13 +12570,8 @@
             </a:r>
             <a:r>
               <a:rPr lang="en-US" dirty="0"/>
-              <a:t>	 Gaurav </a:t>
+              <a:t>	 Gaurav FNU</a:t>
             </a:r>
-            <a:r>
-              <a:rPr lang="en-US" dirty="0" err="1"/>
-              <a:t>girdhar</a:t>
-            </a:r>
-            <a:endParaRPr lang="en-US" dirty="0"/>
           </a:p>
           <a:p>
             <a:r>
@@ -12602,10 +12599,10 @@
       </p:sp>
       <p:pic>
         <p:nvPicPr>
-          <p:cNvPr id="13" name="Picture 12">
+          <p:cNvPr id="6" name="Picture 5">
             <a:extLst>
               <a:ext uri="{FF2B5EF4-FFF2-40B4-BE49-F238E27FC236}">
-                <a16:creationId xmlns:a16="http://schemas.microsoft.com/office/drawing/2014/main" id="{12D09113-8410-4092-A8AC-77B20FCDEF21}"/>
+                <a16:creationId xmlns:a16="http://schemas.microsoft.com/office/drawing/2014/main" id="{C04D2CE3-FADE-4444-BF01-5877D5BCC980}"/>
               </a:ext>
             </a:extLst>
           </p:cNvPr>
@@ -12622,18 +12619,347 @@
         </p:blipFill>
         <p:spPr>
           <a:xfrm>
-            <a:off x="5328116" y="2351315"/>
-            <a:ext cx="1535767" cy="1420585"/>
+            <a:off x="392754" y="1250831"/>
+            <a:ext cx="1513831" cy="1508611"/>
           </a:xfrm>
           <a:prstGeom prst="rect">
             <a:avLst/>
           </a:prstGeom>
         </p:spPr>
       </p:pic>
+      <p:pic>
+        <p:nvPicPr>
+          <p:cNvPr id="7" name="Picture 6">
+            <a:extLst>
+              <a:ext uri="{FF2B5EF4-FFF2-40B4-BE49-F238E27FC236}">
+                <a16:creationId xmlns:a16="http://schemas.microsoft.com/office/drawing/2014/main" id="{2A8D4E12-6DAC-43E1-B8A5-DAB48EDC7D6E}"/>
+              </a:ext>
+            </a:extLst>
+          </p:cNvPr>
+          <p:cNvPicPr>
+            <a:picLocks noChangeAspect="1"/>
+          </p:cNvPicPr>
+          <p:nvPr/>
+        </p:nvPicPr>
+        <p:blipFill>
+          <a:blip r:embed="rId3"/>
+          <a:stretch>
+            <a:fillRect/>
+          </a:stretch>
+        </p:blipFill>
+        <p:spPr>
+          <a:xfrm>
+            <a:off x="3766263" y="1243150"/>
+            <a:ext cx="1513831" cy="1508611"/>
+          </a:xfrm>
+          <a:prstGeom prst="rect">
+            <a:avLst/>
+          </a:prstGeom>
+        </p:spPr>
+      </p:pic>
+      <p:pic>
+        <p:nvPicPr>
+          <p:cNvPr id="8" name="Picture 7">
+            <a:extLst>
+              <a:ext uri="{FF2B5EF4-FFF2-40B4-BE49-F238E27FC236}">
+                <a16:creationId xmlns:a16="http://schemas.microsoft.com/office/drawing/2014/main" id="{DEC9A47A-34DF-4FB6-877F-3C1541D6D98D}"/>
+              </a:ext>
+            </a:extLst>
+          </p:cNvPr>
+          <p:cNvPicPr>
+            <a:picLocks noChangeAspect="1"/>
+          </p:cNvPicPr>
+          <p:nvPr/>
+        </p:nvPicPr>
+        <p:blipFill>
+          <a:blip r:embed="rId4"/>
+          <a:stretch>
+            <a:fillRect/>
+          </a:stretch>
+        </p:blipFill>
+        <p:spPr>
+          <a:xfrm>
+            <a:off x="5395070" y="1237428"/>
+            <a:ext cx="1513832" cy="1508612"/>
+          </a:xfrm>
+          <a:prstGeom prst="rect">
+            <a:avLst/>
+          </a:prstGeom>
+        </p:spPr>
+      </p:pic>
+      <p:pic>
+        <p:nvPicPr>
+          <p:cNvPr id="9" name="Picture 8">
+            <a:extLst>
+              <a:ext uri="{FF2B5EF4-FFF2-40B4-BE49-F238E27FC236}">
+                <a16:creationId xmlns:a16="http://schemas.microsoft.com/office/drawing/2014/main" id="{75A97654-9ACF-43A2-BA5E-3ACE534F6BB1}"/>
+              </a:ext>
+            </a:extLst>
+          </p:cNvPr>
+          <p:cNvPicPr>
+            <a:picLocks noChangeAspect="1"/>
+          </p:cNvPicPr>
+          <p:nvPr/>
+        </p:nvPicPr>
+        <p:blipFill>
+          <a:blip r:embed="rId5"/>
+          <a:stretch>
+            <a:fillRect/>
+          </a:stretch>
+        </p:blipFill>
+        <p:spPr>
+          <a:xfrm>
+            <a:off x="7050582" y="1229294"/>
+            <a:ext cx="1513832" cy="1508612"/>
+          </a:xfrm>
+          <a:prstGeom prst="rect">
+            <a:avLst/>
+          </a:prstGeom>
+        </p:spPr>
+      </p:pic>
+      <p:pic>
+        <p:nvPicPr>
+          <p:cNvPr id="10" name="Picture 9">
+            <a:extLst>
+              <a:ext uri="{FF2B5EF4-FFF2-40B4-BE49-F238E27FC236}">
+                <a16:creationId xmlns:a16="http://schemas.microsoft.com/office/drawing/2014/main" id="{9B7E195B-B314-46BB-9947-09C095EEE81B}"/>
+              </a:ext>
+            </a:extLst>
+          </p:cNvPr>
+          <p:cNvPicPr>
+            <a:picLocks noChangeAspect="1"/>
+          </p:cNvPicPr>
+          <p:nvPr/>
+        </p:nvPicPr>
+        <p:blipFill>
+          <a:blip r:embed="rId6"/>
+          <a:stretch>
+            <a:fillRect/>
+          </a:stretch>
+        </p:blipFill>
+        <p:spPr>
+          <a:xfrm>
+            <a:off x="8712816" y="1244130"/>
+            <a:ext cx="1507107" cy="1501910"/>
+          </a:xfrm>
+          <a:prstGeom prst="rect">
+            <a:avLst/>
+          </a:prstGeom>
+        </p:spPr>
+      </p:pic>
+      <p:pic>
+        <p:nvPicPr>
+          <p:cNvPr id="11" name="Picture 10">
+            <a:extLst>
+              <a:ext uri="{FF2B5EF4-FFF2-40B4-BE49-F238E27FC236}">
+                <a16:creationId xmlns:a16="http://schemas.microsoft.com/office/drawing/2014/main" id="{EBF10B3E-7F59-4AE2-B659-45D4C2DBBC08}"/>
+              </a:ext>
+            </a:extLst>
+          </p:cNvPr>
+          <p:cNvPicPr>
+            <a:picLocks noChangeAspect="1"/>
+          </p:cNvPicPr>
+          <p:nvPr/>
+        </p:nvPicPr>
+        <p:blipFill>
+          <a:blip r:embed="rId7"/>
+          <a:stretch>
+            <a:fillRect/>
+          </a:stretch>
+        </p:blipFill>
+        <p:spPr>
+          <a:xfrm>
+            <a:off x="10371077" y="1244130"/>
+            <a:ext cx="1507107" cy="1501910"/>
+          </a:xfrm>
+          <a:prstGeom prst="rect">
+            <a:avLst/>
+          </a:prstGeom>
+        </p:spPr>
+      </p:pic>
+      <p:pic>
+        <p:nvPicPr>
+          <p:cNvPr id="12" name="Picture 11">
+            <a:extLst>
+              <a:ext uri="{FF2B5EF4-FFF2-40B4-BE49-F238E27FC236}">
+                <a16:creationId xmlns:a16="http://schemas.microsoft.com/office/drawing/2014/main" id="{F3A2CC9D-FB19-4D63-894F-B0AE04B6056D}"/>
+              </a:ext>
+            </a:extLst>
+          </p:cNvPr>
+          <p:cNvPicPr>
+            <a:picLocks noChangeAspect="1"/>
+          </p:cNvPicPr>
+          <p:nvPr/>
+        </p:nvPicPr>
+        <p:blipFill>
+          <a:blip r:embed="rId8"/>
+          <a:stretch>
+            <a:fillRect/>
+          </a:stretch>
+        </p:blipFill>
+        <p:spPr>
+          <a:xfrm>
+            <a:off x="2099190" y="1250831"/>
+            <a:ext cx="1513831" cy="1508611"/>
+          </a:xfrm>
+          <a:prstGeom prst="rect">
+            <a:avLst/>
+          </a:prstGeom>
+        </p:spPr>
+      </p:pic>
+      <p:sp>
+        <p:nvSpPr>
+          <p:cNvPr id="14" name="TextBox 13">
+            <a:extLst>
+              <a:ext uri="{FF2B5EF4-FFF2-40B4-BE49-F238E27FC236}">
+                <a16:creationId xmlns:a16="http://schemas.microsoft.com/office/drawing/2014/main" id="{6F9E1177-B80E-4CEF-A256-343DFAE24982}"/>
+              </a:ext>
+            </a:extLst>
+          </p:cNvPr>
+          <p:cNvSpPr txBox="1"/>
+          <p:nvPr/>
+        </p:nvSpPr>
+        <p:spPr>
+          <a:xfrm>
+            <a:off x="543338" y="2915478"/>
+            <a:ext cx="11290853" cy="492443"/>
+          </a:xfrm>
+          <a:prstGeom prst="rect">
+            <a:avLst/>
+          </a:prstGeom>
+          <a:noFill/>
+        </p:spPr>
+        <p:txBody>
+          <a:bodyPr wrap="square" rtlCol="0">
+            <a:spAutoFit/>
+          </a:bodyPr>
+          <a:lstStyle/>
+          <a:p>
+            <a:r>
+              <a:rPr lang="en-US" sz="2600" b="1" dirty="0"/>
+              <a:t>Classes:</a:t>
+            </a:r>
+            <a:r>
+              <a:rPr lang="en-US" sz="2600" dirty="0"/>
+              <a:t> 0=Angry, 1=Disgust, 2=Fear, 3=Happy, 4=Sad, 5=Surprise, 6=Neutral</a:t>
+            </a:r>
+          </a:p>
+        </p:txBody>
+      </p:sp>
     </p:spTree>
     <p:extLst>
       <p:ext uri="{BB962C8B-B14F-4D97-AF65-F5344CB8AC3E}">
         <p14:creationId xmlns:p14="http://schemas.microsoft.com/office/powerpoint/2010/main" val="1174980217"/>
+      </p:ext>
+    </p:extLst>
+  </p:cSld>
+  <p:clrMapOvr>
+    <a:masterClrMapping/>
+  </p:clrMapOvr>
+</p:sld>
+</file>
+
+<file path=ppt/slides/slide10.xml><?xml version="1.0" encoding="utf-8"?>
+<p:sld xmlns:a="http://schemas.openxmlformats.org/drawingml/2006/main" xmlns:r="http://schemas.openxmlformats.org/officeDocument/2006/relationships" xmlns:p="http://schemas.openxmlformats.org/presentationml/2006/main">
+  <p:cSld>
+    <p:spTree>
+      <p:nvGrpSpPr>
+        <p:cNvPr id="1" name=""/>
+        <p:cNvGrpSpPr/>
+        <p:nvPr/>
+      </p:nvGrpSpPr>
+      <p:grpSpPr>
+        <a:xfrm>
+          <a:off x="0" y="0"/>
+          <a:ext cx="0" cy="0"/>
+          <a:chOff x="0" y="0"/>
+          <a:chExt cx="0" cy="0"/>
+        </a:xfrm>
+      </p:grpSpPr>
+      <p:sp>
+        <p:nvSpPr>
+          <p:cNvPr id="2" name="Title 1">
+            <a:extLst>
+              <a:ext uri="{FF2B5EF4-FFF2-40B4-BE49-F238E27FC236}">
+                <a16:creationId xmlns:a16="http://schemas.microsoft.com/office/drawing/2014/main" id="{6AEBB5A1-F934-4332-9BD3-85C1F9DE1846}"/>
+              </a:ext>
+            </a:extLst>
+          </p:cNvPr>
+          <p:cNvSpPr>
+            <a:spLocks noGrp="1"/>
+          </p:cNvSpPr>
+          <p:nvPr>
+            <p:ph type="title"/>
+          </p:nvPr>
+        </p:nvSpPr>
+        <p:spPr/>
+        <p:txBody>
+          <a:bodyPr>
+            <a:normAutofit/>
+          </a:bodyPr>
+          <a:lstStyle/>
+          <a:p>
+            <a:r>
+              <a:rPr lang="en-US" dirty="0"/>
+              <a:t>Histogram classifier results</a:t>
+            </a:r>
+          </a:p>
+        </p:txBody>
+      </p:sp>
+      <p:sp>
+        <p:nvSpPr>
+          <p:cNvPr id="3" name="Content Placeholder 2">
+            <a:extLst>
+              <a:ext uri="{FF2B5EF4-FFF2-40B4-BE49-F238E27FC236}">
+                <a16:creationId xmlns:a16="http://schemas.microsoft.com/office/drawing/2014/main" id="{D0053B46-A715-4C18-808B-247F667DCCD6}"/>
+              </a:ext>
+            </a:extLst>
+          </p:cNvPr>
+          <p:cNvSpPr>
+            <a:spLocks noGrp="1"/>
+          </p:cNvSpPr>
+          <p:nvPr>
+            <p:ph sz="half" idx="1"/>
+          </p:nvPr>
+        </p:nvSpPr>
+        <p:spPr/>
+        <p:txBody>
+          <a:bodyPr/>
+          <a:lstStyle/>
+          <a:p>
+            <a:endParaRPr lang="en-US"/>
+          </a:p>
+        </p:txBody>
+      </p:sp>
+      <p:sp>
+        <p:nvSpPr>
+          <p:cNvPr id="4" name="Content Placeholder 3">
+            <a:extLst>
+              <a:ext uri="{FF2B5EF4-FFF2-40B4-BE49-F238E27FC236}">
+                <a16:creationId xmlns:a16="http://schemas.microsoft.com/office/drawing/2014/main" id="{8B00685F-05AE-4218-8A6C-B8181DD361B4}"/>
+              </a:ext>
+            </a:extLst>
+          </p:cNvPr>
+          <p:cNvSpPr>
+            <a:spLocks noGrp="1"/>
+          </p:cNvSpPr>
+          <p:nvPr>
+            <p:ph sz="half" idx="2"/>
+          </p:nvPr>
+        </p:nvSpPr>
+        <p:spPr/>
+        <p:txBody>
+          <a:bodyPr/>
+          <a:lstStyle/>
+          <a:p>
+            <a:endParaRPr lang="en-US"/>
+          </a:p>
+        </p:txBody>
+      </p:sp>
+    </p:spTree>
+    <p:extLst>
+      <p:ext uri="{BB962C8B-B14F-4D97-AF65-F5344CB8AC3E}">
+        <p14:creationId xmlns:p14="http://schemas.microsoft.com/office/powerpoint/2010/main" val="1567941571"/>
       </p:ext>
     </p:extLst>
   </p:cSld>
@@ -12716,7 +13042,9 @@
         </p:nvSpPr>
         <p:spPr/>
         <p:txBody>
-          <a:bodyPr/>
+          <a:bodyPr>
+            <a:normAutofit/>
+          </a:bodyPr>
           <a:lstStyle/>
           <a:p>
             <a:r>
@@ -12742,41 +13070,69 @@
             <p:ph sz="half" idx="2"/>
           </p:nvPr>
         </p:nvSpPr>
-        <p:spPr/>
+        <p:spPr>
+          <a:xfrm>
+            <a:off x="4545496" y="2249486"/>
+            <a:ext cx="6501915" cy="3541714"/>
+          </a:xfrm>
+        </p:spPr>
         <p:txBody>
-          <a:bodyPr/>
+          <a:bodyPr>
+            <a:normAutofit/>
+          </a:bodyPr>
           <a:lstStyle/>
           <a:p>
+            <a:pPr marL="0" indent="0">
+              <a:buNone/>
+            </a:pPr>
             <a:r>
               <a:rPr lang="en-US" dirty="0"/>
               <a:t>Methodology:</a:t>
             </a:r>
-            <a:br>
-              <a:rPr lang="en-US" dirty="0"/>
-            </a:br>
+          </a:p>
+          <a:p>
+            <a:pPr marL="457200" indent="-457200">
+              <a:buFont typeface="+mj-lt"/>
+              <a:buAutoNum type="arabicPeriod"/>
+            </a:pPr>
             <a:r>
-              <a:rPr lang="en-US" dirty="0"/>
-              <a:t>1. Histogram</a:t>
+              <a:rPr lang="en-US" sz="2000" dirty="0"/>
+              <a:t>Linear Classification Analysis</a:t>
+            </a:r>
+          </a:p>
+          <a:p>
+            <a:pPr marL="457200" indent="-457200">
+              <a:buFont typeface="+mj-lt"/>
+              <a:buAutoNum type="arabicPeriod"/>
+            </a:pPr>
+            <a:r>
+              <a:rPr lang="en-US" sz="2000" dirty="0"/>
+              <a:t>Logistic Regression Analysis</a:t>
+            </a:r>
+          </a:p>
+          <a:p>
+            <a:pPr marL="457200" indent="-457200">
+              <a:buFont typeface="+mj-lt"/>
+              <a:buAutoNum type="arabicPeriod"/>
+            </a:pPr>
+            <a:r>
+              <a:rPr lang="en-US" sz="2000" dirty="0"/>
+              <a:t>Principal Component Analysis</a:t>
+            </a:r>
+          </a:p>
+          <a:p>
+            <a:pPr marL="457200" indent="-457200">
+              <a:buFont typeface="+mj-lt"/>
+              <a:buAutoNum type="arabicPeriod"/>
+            </a:pPr>
+            <a:r>
+              <a:rPr lang="en-US" sz="2000" dirty="0"/>
+              <a:t>Neural Networks</a:t>
             </a:r>
             <a:br>
-              <a:rPr lang="en-US" dirty="0"/>
+              <a:rPr lang="en-US" sz="2000" dirty="0"/>
             </a:br>
-            <a:r>
-              <a:rPr lang="en-US" dirty="0"/>
-              <a:t>2. Principal component analysis</a:t>
-            </a:r>
-            <a:br>
-              <a:rPr lang="en-US" dirty="0"/>
-            </a:br>
-            <a:r>
-              <a:rPr lang="en-US" dirty="0"/>
-              <a:t>3. linear </a:t>
-            </a:r>
-            <a:r>
-              <a:rPr lang="en-US" dirty="0" err="1"/>
-              <a:t>classifer</a:t>
-            </a:r>
-            <a:endParaRPr lang="en-US" dirty="0"/>
+            <a:endParaRPr lang="en-US" sz="2000" dirty="0"/>
           </a:p>
         </p:txBody>
       </p:sp>
@@ -12812,253 +13168,86 @@
       </p:grpSpPr>
       <p:sp>
         <p:nvSpPr>
-          <p:cNvPr id="5" name="TextBox 4">
+          <p:cNvPr id="2" name="Title 1">
             <a:extLst>
               <a:ext uri="{FF2B5EF4-FFF2-40B4-BE49-F238E27FC236}">
-                <a16:creationId xmlns:a16="http://schemas.microsoft.com/office/drawing/2014/main" id="{A4DCDF8D-7785-F245-BA83-13B4E82F6E6A}"/>
+                <a16:creationId xmlns:a16="http://schemas.microsoft.com/office/drawing/2014/main" id="{DACA88CE-21C6-4B0E-A7F8-45202789E753}"/>
               </a:ext>
             </a:extLst>
           </p:cNvPr>
-          <p:cNvSpPr txBox="1"/>
-          <p:nvPr/>
+          <p:cNvSpPr>
+            <a:spLocks noGrp="1"/>
+          </p:cNvSpPr>
+          <p:nvPr>
+            <p:ph type="title"/>
+          </p:nvPr>
         </p:nvSpPr>
-        <p:spPr>
-          <a:xfrm>
-            <a:off x="543338" y="2001078"/>
-            <a:ext cx="11290853" cy="492443"/>
-          </a:xfrm>
-          <a:prstGeom prst="rect">
-            <a:avLst/>
-          </a:prstGeom>
-          <a:noFill/>
-        </p:spPr>
+        <p:spPr/>
         <p:txBody>
-          <a:bodyPr wrap="square" rtlCol="0">
-            <a:spAutoFit/>
-          </a:bodyPr>
+          <a:bodyPr/>
           <a:lstStyle/>
           <a:p>
             <a:r>
-              <a:rPr lang="en-US" sz="2600" dirty="0"/>
-              <a:t>Classes: 0=Angry, 1=Disgust, 2=Fear, 3=Happy, 4=Sad, 5=Surprise, 6=Neutral</a:t>
+              <a:rPr lang="en-US" dirty="0"/>
+              <a:t>Linear classifier</a:t>
             </a:r>
           </a:p>
         </p:txBody>
       </p:sp>
-      <p:pic>
-        <p:nvPicPr>
-          <p:cNvPr id="6" name="Picture 5">
+      <p:sp>
+        <p:nvSpPr>
+          <p:cNvPr id="3" name="Content Placeholder 2">
             <a:extLst>
               <a:ext uri="{FF2B5EF4-FFF2-40B4-BE49-F238E27FC236}">
-                <a16:creationId xmlns:a16="http://schemas.microsoft.com/office/drawing/2014/main" id="{241E2366-F09A-FE45-A8BB-C6D157765E3B}"/>
+                <a16:creationId xmlns:a16="http://schemas.microsoft.com/office/drawing/2014/main" id="{FA0C8D5D-E5D2-44E2-84C9-DB263BC00B11}"/>
               </a:ext>
             </a:extLst>
           </p:cNvPr>
-          <p:cNvPicPr>
-            <a:picLocks noChangeAspect="1"/>
-          </p:cNvPicPr>
-          <p:nvPr/>
-        </p:nvPicPr>
-        <p:blipFill>
-          <a:blip r:embed="rId2"/>
-          <a:stretch>
-            <a:fillRect/>
-          </a:stretch>
-        </p:blipFill>
-        <p:spPr>
-          <a:xfrm>
-            <a:off x="951086" y="2658116"/>
-            <a:ext cx="1898294" cy="1891748"/>
-          </a:xfrm>
-          <a:prstGeom prst="rect">
-            <a:avLst/>
-          </a:prstGeom>
-        </p:spPr>
-      </p:pic>
-      <p:pic>
-        <p:nvPicPr>
-          <p:cNvPr id="8" name="Picture 7">
+          <p:cNvSpPr>
+            <a:spLocks noGrp="1"/>
+          </p:cNvSpPr>
+          <p:nvPr>
+            <p:ph sz="half" idx="1"/>
+          </p:nvPr>
+        </p:nvSpPr>
+        <p:spPr/>
+        <p:txBody>
+          <a:bodyPr/>
+          <a:lstStyle/>
+          <a:p>
+            <a:endParaRPr lang="en-US"/>
+          </a:p>
+        </p:txBody>
+      </p:sp>
+      <p:sp>
+        <p:nvSpPr>
+          <p:cNvPr id="4" name="Content Placeholder 3">
             <a:extLst>
               <a:ext uri="{FF2B5EF4-FFF2-40B4-BE49-F238E27FC236}">
-                <a16:creationId xmlns:a16="http://schemas.microsoft.com/office/drawing/2014/main" id="{7FBD65BA-5874-A946-973E-C3283D31A024}"/>
+                <a16:creationId xmlns:a16="http://schemas.microsoft.com/office/drawing/2014/main" id="{18B30F1E-0F8D-4C56-9A12-89065408D6AB}"/>
               </a:ext>
             </a:extLst>
           </p:cNvPr>
-          <p:cNvPicPr>
-            <a:picLocks noChangeAspect="1"/>
-          </p:cNvPicPr>
-          <p:nvPr/>
-        </p:nvPicPr>
-        <p:blipFill>
-          <a:blip r:embed="rId3"/>
-          <a:stretch>
-            <a:fillRect/>
-          </a:stretch>
-        </p:blipFill>
-        <p:spPr>
-          <a:xfrm>
-            <a:off x="5132971" y="2663689"/>
-            <a:ext cx="1898294" cy="1891748"/>
-          </a:xfrm>
-          <a:prstGeom prst="rect">
-            <a:avLst/>
-          </a:prstGeom>
-        </p:spPr>
-      </p:pic>
-      <p:pic>
-        <p:nvPicPr>
-          <p:cNvPr id="9" name="Picture 8">
-            <a:extLst>
-              <a:ext uri="{FF2B5EF4-FFF2-40B4-BE49-F238E27FC236}">
-                <a16:creationId xmlns:a16="http://schemas.microsoft.com/office/drawing/2014/main" id="{CB8BC27D-9977-5144-9E08-AF02E35AF7A9}"/>
-              </a:ext>
-            </a:extLst>
-          </p:cNvPr>
-          <p:cNvPicPr>
-            <a:picLocks noChangeAspect="1"/>
-          </p:cNvPicPr>
-          <p:nvPr/>
-        </p:nvPicPr>
-        <p:blipFill>
-          <a:blip r:embed="rId4"/>
-          <a:stretch>
-            <a:fillRect/>
-          </a:stretch>
-        </p:blipFill>
-        <p:spPr>
-          <a:xfrm>
-            <a:off x="7172797" y="2658116"/>
-            <a:ext cx="1898294" cy="1891748"/>
-          </a:xfrm>
-          <a:prstGeom prst="rect">
-            <a:avLst/>
-          </a:prstGeom>
-        </p:spPr>
-      </p:pic>
-      <p:pic>
-        <p:nvPicPr>
-          <p:cNvPr id="10" name="Picture 9">
-            <a:extLst>
-              <a:ext uri="{FF2B5EF4-FFF2-40B4-BE49-F238E27FC236}">
-                <a16:creationId xmlns:a16="http://schemas.microsoft.com/office/drawing/2014/main" id="{08F33DA0-A051-4F44-8916-AD5DC0475633}"/>
-              </a:ext>
-            </a:extLst>
-          </p:cNvPr>
-          <p:cNvPicPr>
-            <a:picLocks noChangeAspect="1"/>
-          </p:cNvPicPr>
-          <p:nvPr/>
-        </p:nvPicPr>
-        <p:blipFill>
-          <a:blip r:embed="rId5"/>
-          <a:stretch>
-            <a:fillRect/>
-          </a:stretch>
-        </p:blipFill>
-        <p:spPr>
-          <a:xfrm>
-            <a:off x="9212623" y="2676488"/>
-            <a:ext cx="1898294" cy="1891748"/>
-          </a:xfrm>
-          <a:prstGeom prst="rect">
-            <a:avLst/>
-          </a:prstGeom>
-        </p:spPr>
-      </p:pic>
-      <p:pic>
-        <p:nvPicPr>
-          <p:cNvPr id="11" name="Picture 10">
-            <a:extLst>
-              <a:ext uri="{FF2B5EF4-FFF2-40B4-BE49-F238E27FC236}">
-                <a16:creationId xmlns:a16="http://schemas.microsoft.com/office/drawing/2014/main" id="{426C6092-B2DC-044B-9E5F-34CAFCF0E173}"/>
-              </a:ext>
-            </a:extLst>
-          </p:cNvPr>
-          <p:cNvPicPr>
-            <a:picLocks noChangeAspect="1"/>
-          </p:cNvPicPr>
-          <p:nvPr/>
-        </p:nvPicPr>
-        <p:blipFill>
-          <a:blip r:embed="rId6"/>
-          <a:stretch>
-            <a:fillRect/>
-          </a:stretch>
-        </p:blipFill>
-        <p:spPr>
-          <a:xfrm>
-            <a:off x="3622688" y="4714460"/>
-            <a:ext cx="1898295" cy="1891749"/>
-          </a:xfrm>
-          <a:prstGeom prst="rect">
-            <a:avLst/>
-          </a:prstGeom>
-        </p:spPr>
-      </p:pic>
-      <p:pic>
-        <p:nvPicPr>
-          <p:cNvPr id="12" name="Picture 11">
-            <a:extLst>
-              <a:ext uri="{FF2B5EF4-FFF2-40B4-BE49-F238E27FC236}">
-                <a16:creationId xmlns:a16="http://schemas.microsoft.com/office/drawing/2014/main" id="{EB377905-4BC6-124F-906F-B0FF5BF986EC}"/>
-              </a:ext>
-            </a:extLst>
-          </p:cNvPr>
-          <p:cNvPicPr>
-            <a:picLocks noChangeAspect="1"/>
-          </p:cNvPicPr>
-          <p:nvPr/>
-        </p:nvPicPr>
-        <p:blipFill>
-          <a:blip r:embed="rId7"/>
-          <a:stretch>
-            <a:fillRect/>
-          </a:stretch>
-        </p:blipFill>
-        <p:spPr>
-          <a:xfrm>
-            <a:off x="5721871" y="4714460"/>
-            <a:ext cx="1898295" cy="1891749"/>
-          </a:xfrm>
-          <a:prstGeom prst="rect">
-            <a:avLst/>
-          </a:prstGeom>
-        </p:spPr>
-      </p:pic>
-      <p:pic>
-        <p:nvPicPr>
-          <p:cNvPr id="13" name="Picture 12">
-            <a:extLst>
-              <a:ext uri="{FF2B5EF4-FFF2-40B4-BE49-F238E27FC236}">
-                <a16:creationId xmlns:a16="http://schemas.microsoft.com/office/drawing/2014/main" id="{2E9BD830-194C-974F-8FAA-DD760FF040B5}"/>
-              </a:ext>
-            </a:extLst>
-          </p:cNvPr>
-          <p:cNvPicPr>
-            <a:picLocks noChangeAspect="1"/>
-          </p:cNvPicPr>
-          <p:nvPr/>
-        </p:nvPicPr>
-        <p:blipFill>
-          <a:blip r:embed="rId8"/>
-          <a:stretch>
-            <a:fillRect/>
-          </a:stretch>
-        </p:blipFill>
-        <p:spPr>
-          <a:xfrm>
-            <a:off x="3042028" y="2671517"/>
-            <a:ext cx="1898295" cy="1891749"/>
-          </a:xfrm>
-          <a:prstGeom prst="rect">
-            <a:avLst/>
-          </a:prstGeom>
-        </p:spPr>
-      </p:pic>
+          <p:cNvSpPr>
+            <a:spLocks noGrp="1"/>
+          </p:cNvSpPr>
+          <p:nvPr>
+            <p:ph sz="half" idx="2"/>
+          </p:nvPr>
+        </p:nvSpPr>
+        <p:spPr/>
+        <p:txBody>
+          <a:bodyPr/>
+          <a:lstStyle/>
+          <a:p>
+            <a:endParaRPr lang="en-US"/>
+          </a:p>
+        </p:txBody>
+      </p:sp>
     </p:spTree>
     <p:extLst>
       <p:ext uri="{BB962C8B-B14F-4D97-AF65-F5344CB8AC3E}">
-        <p14:creationId xmlns:p14="http://schemas.microsoft.com/office/powerpoint/2010/main" val="2764635835"/>
+        <p14:creationId xmlns:p14="http://schemas.microsoft.com/office/powerpoint/2010/main" val="3348931744"/>
       </p:ext>
     </p:extLst>
   </p:cSld>
@@ -13069,6 +13258,115 @@
 </file>
 
 <file path=ppt/slides/slide4.xml><?xml version="1.0" encoding="utf-8"?>
+<p:sld xmlns:a="http://schemas.openxmlformats.org/drawingml/2006/main" xmlns:r="http://schemas.openxmlformats.org/officeDocument/2006/relationships" xmlns:p="http://schemas.openxmlformats.org/presentationml/2006/main">
+  <p:cSld>
+    <p:spTree>
+      <p:nvGrpSpPr>
+        <p:cNvPr id="1" name=""/>
+        <p:cNvGrpSpPr/>
+        <p:nvPr/>
+      </p:nvGrpSpPr>
+      <p:grpSpPr>
+        <a:xfrm>
+          <a:off x="0" y="0"/>
+          <a:ext cx="0" cy="0"/>
+          <a:chOff x="0" y="0"/>
+          <a:chExt cx="0" cy="0"/>
+        </a:xfrm>
+      </p:grpSpPr>
+      <p:sp>
+        <p:nvSpPr>
+          <p:cNvPr id="2" name="Title 1">
+            <a:extLst>
+              <a:ext uri="{FF2B5EF4-FFF2-40B4-BE49-F238E27FC236}">
+                <a16:creationId xmlns:a16="http://schemas.microsoft.com/office/drawing/2014/main" id="{DACA88CE-21C6-4B0E-A7F8-45202789E753}"/>
+              </a:ext>
+            </a:extLst>
+          </p:cNvPr>
+          <p:cNvSpPr>
+            <a:spLocks noGrp="1"/>
+          </p:cNvSpPr>
+          <p:nvPr>
+            <p:ph type="title"/>
+          </p:nvPr>
+        </p:nvSpPr>
+        <p:spPr/>
+        <p:txBody>
+          <a:bodyPr/>
+          <a:lstStyle/>
+          <a:p>
+            <a:r>
+              <a:rPr lang="en-US"/>
+              <a:t>Logistic Regression</a:t>
+            </a:r>
+            <a:endParaRPr lang="en-US" dirty="0"/>
+          </a:p>
+        </p:txBody>
+      </p:sp>
+      <p:sp>
+        <p:nvSpPr>
+          <p:cNvPr id="3" name="Content Placeholder 2">
+            <a:extLst>
+              <a:ext uri="{FF2B5EF4-FFF2-40B4-BE49-F238E27FC236}">
+                <a16:creationId xmlns:a16="http://schemas.microsoft.com/office/drawing/2014/main" id="{FA0C8D5D-E5D2-44E2-84C9-DB263BC00B11}"/>
+              </a:ext>
+            </a:extLst>
+          </p:cNvPr>
+          <p:cNvSpPr>
+            <a:spLocks noGrp="1"/>
+          </p:cNvSpPr>
+          <p:nvPr>
+            <p:ph sz="half" idx="1"/>
+          </p:nvPr>
+        </p:nvSpPr>
+        <p:spPr/>
+        <p:txBody>
+          <a:bodyPr/>
+          <a:lstStyle/>
+          <a:p>
+            <a:endParaRPr lang="en-US"/>
+          </a:p>
+        </p:txBody>
+      </p:sp>
+      <p:sp>
+        <p:nvSpPr>
+          <p:cNvPr id="4" name="Content Placeholder 3">
+            <a:extLst>
+              <a:ext uri="{FF2B5EF4-FFF2-40B4-BE49-F238E27FC236}">
+                <a16:creationId xmlns:a16="http://schemas.microsoft.com/office/drawing/2014/main" id="{18B30F1E-0F8D-4C56-9A12-89065408D6AB}"/>
+              </a:ext>
+            </a:extLst>
+          </p:cNvPr>
+          <p:cNvSpPr>
+            <a:spLocks noGrp="1"/>
+          </p:cNvSpPr>
+          <p:nvPr>
+            <p:ph sz="half" idx="2"/>
+          </p:nvPr>
+        </p:nvSpPr>
+        <p:spPr/>
+        <p:txBody>
+          <a:bodyPr/>
+          <a:lstStyle/>
+          <a:p>
+            <a:endParaRPr lang="en-US"/>
+          </a:p>
+        </p:txBody>
+      </p:sp>
+    </p:spTree>
+    <p:extLst>
+      <p:ext uri="{BB962C8B-B14F-4D97-AF65-F5344CB8AC3E}">
+        <p14:creationId xmlns:p14="http://schemas.microsoft.com/office/powerpoint/2010/main" val="3167898224"/>
+      </p:ext>
+    </p:extLst>
+  </p:cSld>
+  <p:clrMapOvr>
+    <a:masterClrMapping/>
+  </p:clrMapOvr>
+</p:sld>
+</file>
+
+<file path=ppt/slides/slide5.xml><?xml version="1.0" encoding="utf-8"?>
 <p:sld xmlns:a="http://schemas.openxmlformats.org/drawingml/2006/main" xmlns:r="http://schemas.openxmlformats.org/officeDocument/2006/relationships" xmlns:p="http://schemas.openxmlformats.org/presentationml/2006/main">
   <p:cSld>
     <p:spTree>
@@ -13107,7 +13405,7 @@
         </p:blipFill>
         <p:spPr>
           <a:xfrm>
-            <a:off x="622852" y="2249557"/>
+            <a:off x="622852" y="3124201"/>
             <a:ext cx="1860550" cy="1879600"/>
           </a:xfrm>
           <a:prstGeom prst="rect">
@@ -13129,7 +13427,7 @@
         </p:nvSpPr>
         <p:spPr>
           <a:xfrm>
-            <a:off x="1289272" y="1294369"/>
+            <a:off x="1289272" y="1956977"/>
             <a:ext cx="643125" cy="461665"/>
           </a:xfrm>
           <a:prstGeom prst="rect">
@@ -13207,8 +13505,8 @@
         </p:blipFill>
         <p:spPr>
           <a:xfrm>
-            <a:off x="3366052" y="764064"/>
-            <a:ext cx="1953316" cy="1973315"/>
+            <a:off x="3290528" y="1386160"/>
+            <a:ext cx="2104361" cy="2125906"/>
           </a:xfrm>
           <a:prstGeom prst="rect">
             <a:avLst/>
@@ -13237,8 +13535,8 @@
         </p:blipFill>
         <p:spPr>
           <a:xfrm>
-            <a:off x="5852189" y="764065"/>
-            <a:ext cx="1953316" cy="1973316"/>
+            <a:off x="6024463" y="1342675"/>
+            <a:ext cx="2104362" cy="2125909"/>
           </a:xfrm>
           <a:prstGeom prst="rect">
             <a:avLst/>
@@ -13267,8 +13565,8 @@
         </p:blipFill>
         <p:spPr>
           <a:xfrm>
-            <a:off x="8688155" y="764064"/>
-            <a:ext cx="1953316" cy="1973316"/>
+            <a:off x="8688156" y="1328076"/>
+            <a:ext cx="2133263" cy="2155105"/>
           </a:xfrm>
           <a:prstGeom prst="rect">
             <a:avLst/>
@@ -13297,7 +13595,7 @@
         </p:blipFill>
         <p:spPr>
           <a:xfrm>
-            <a:off x="3290529" y="3968029"/>
+            <a:off x="3290529" y="4352342"/>
             <a:ext cx="2104361" cy="2125907"/>
           </a:xfrm>
           <a:prstGeom prst="rect">
@@ -13327,7 +13625,7 @@
         </p:blipFill>
         <p:spPr>
           <a:xfrm>
-            <a:off x="5852189" y="3968027"/>
+            <a:off x="5989341" y="4352341"/>
             <a:ext cx="2104362" cy="2125908"/>
           </a:xfrm>
           <a:prstGeom prst="rect">
@@ -13357,7 +13655,7 @@
         </p:blipFill>
         <p:spPr>
           <a:xfrm>
-            <a:off x="8688155" y="3968027"/>
+            <a:off x="8688155" y="4352341"/>
             <a:ext cx="2133264" cy="2125908"/>
           </a:xfrm>
           <a:prstGeom prst="rect">
@@ -13379,7 +13677,7 @@
         </p:nvSpPr>
         <p:spPr>
           <a:xfrm>
-            <a:off x="3778291" y="236809"/>
+            <a:off x="3687528" y="735190"/>
             <a:ext cx="1382110" cy="461665"/>
           </a:xfrm>
           <a:prstGeom prst="rect">
@@ -13418,7 +13716,7 @@
         </p:nvSpPr>
         <p:spPr>
           <a:xfrm>
-            <a:off x="6339952" y="236809"/>
+            <a:off x="6350467" y="698473"/>
             <a:ext cx="1382110" cy="461665"/>
           </a:xfrm>
           <a:prstGeom prst="rect">
@@ -13457,7 +13755,7 @@
         </p:nvSpPr>
         <p:spPr>
           <a:xfrm>
-            <a:off x="8910440" y="236808"/>
+            <a:off x="8844180" y="698473"/>
             <a:ext cx="1508746" cy="461665"/>
           </a:xfrm>
           <a:prstGeom prst="rect">
@@ -13478,6 +13776,48 @@
             <a:r>
               <a:rPr lang="en-US" sz="2400" dirty="0"/>
               <a:t>degrees</a:t>
+            </a:r>
+          </a:p>
+        </p:txBody>
+      </p:sp>
+      <p:sp>
+        <p:nvSpPr>
+          <p:cNvPr id="2" name="Rectangle 1">
+            <a:extLst>
+              <a:ext uri="{FF2B5EF4-FFF2-40B4-BE49-F238E27FC236}">
+                <a16:creationId xmlns:a16="http://schemas.microsoft.com/office/drawing/2014/main" id="{E3222E19-2670-4835-9385-7B4B7C92EB90}"/>
+              </a:ext>
+            </a:extLst>
+          </p:cNvPr>
+          <p:cNvSpPr/>
+          <p:nvPr/>
+        </p:nvSpPr>
+        <p:spPr>
+          <a:xfrm>
+            <a:off x="967409" y="117713"/>
+            <a:ext cx="11224591" cy="646331"/>
+          </a:xfrm>
+          <a:prstGeom prst="rect">
+            <a:avLst/>
+          </a:prstGeom>
+        </p:spPr>
+        <p:txBody>
+          <a:bodyPr wrap="square">
+            <a:spAutoFit/>
+          </a:bodyPr>
+          <a:lstStyle/>
+          <a:p>
+            <a:r>
+              <a:rPr lang="en-US" sz="3600" dirty="0"/>
+              <a:t>Linear Classifier: </a:t>
+            </a:r>
+            <a:r>
+              <a:rPr lang="en-US" sz="3600" dirty="0">
+                <a:solidFill>
+                  <a:schemeClr val="bg1"/>
+                </a:solidFill>
+              </a:rPr>
+              <a:t>Data Size Increase using Image Rotation</a:t>
             </a:r>
           </a:p>
         </p:txBody>
@@ -13495,7 +13835,7 @@
 </p:sld>
 </file>
 
-<file path=ppt/slides/slide5.xml><?xml version="1.0" encoding="utf-8"?>
+<file path=ppt/slides/slide6.xml><?xml version="1.0" encoding="utf-8"?>
 <p:sld xmlns:a="http://schemas.openxmlformats.org/drawingml/2006/main" xmlns:r="http://schemas.openxmlformats.org/officeDocument/2006/relationships" xmlns:p="http://schemas.openxmlformats.org/presentationml/2006/main">
   <p:cSld>
     <p:spTree>
@@ -13517,7 +13857,7 @@
           <p:cNvPr id="2" name="Title 1">
             <a:extLst>
               <a:ext uri="{FF2B5EF4-FFF2-40B4-BE49-F238E27FC236}">
-                <a16:creationId xmlns:a16="http://schemas.microsoft.com/office/drawing/2014/main" id="{6AEBB5A1-F934-4332-9BD3-85C1F9DE1846}"/>
+                <a16:creationId xmlns:a16="http://schemas.microsoft.com/office/drawing/2014/main" id="{C55C24C6-B163-4227-BDFA-DB2684557434}"/>
               </a:ext>
             </a:extLst>
           </p:cNvPr>
@@ -13530,72 +13870,114 @@
         </p:nvSpPr>
         <p:spPr/>
         <p:txBody>
-          <a:bodyPr>
-            <a:normAutofit/>
-          </a:bodyPr>
+          <a:bodyPr/>
           <a:lstStyle/>
           <a:p>
             <a:r>
               <a:rPr lang="en-US" dirty="0"/>
-              <a:t>Histogram classifier results</a:t>
+              <a:t>linear classifier</a:t>
             </a:r>
           </a:p>
         </p:txBody>
       </p:sp>
-      <p:sp>
-        <p:nvSpPr>
-          <p:cNvPr id="3" name="Content Placeholder 2">
+      <p:pic>
+        <p:nvPicPr>
+          <p:cNvPr id="5" name="Picture 4">
             <a:extLst>
               <a:ext uri="{FF2B5EF4-FFF2-40B4-BE49-F238E27FC236}">
-                <a16:creationId xmlns:a16="http://schemas.microsoft.com/office/drawing/2014/main" id="{D0053B46-A715-4C18-808B-247F667DCCD6}"/>
+                <a16:creationId xmlns:a16="http://schemas.microsoft.com/office/drawing/2014/main" id="{C6DCA446-9741-F641-9A2E-EBE48C542704}"/>
               </a:ext>
             </a:extLst>
           </p:cNvPr>
-          <p:cNvSpPr>
-            <a:spLocks noGrp="1"/>
-          </p:cNvSpPr>
-          <p:nvPr>
-            <p:ph sz="half" idx="1"/>
-          </p:nvPr>
-        </p:nvSpPr>
-        <p:spPr/>
-        <p:txBody>
-          <a:bodyPr/>
-          <a:lstStyle/>
-          <a:p>
-            <a:endParaRPr lang="en-US"/>
-          </a:p>
-        </p:txBody>
-      </p:sp>
+          <p:cNvPicPr>
+            <a:picLocks noChangeAspect="1"/>
+          </p:cNvPicPr>
+          <p:nvPr/>
+        </p:nvPicPr>
+        <p:blipFill>
+          <a:blip r:embed="rId2"/>
+          <a:stretch>
+            <a:fillRect/>
+          </a:stretch>
+        </p:blipFill>
+        <p:spPr>
+          <a:xfrm>
+            <a:off x="6094412" y="2302635"/>
+            <a:ext cx="4958940" cy="2458278"/>
+          </a:xfrm>
+          <a:prstGeom prst="rect">
+            <a:avLst/>
+          </a:prstGeom>
+        </p:spPr>
+      </p:pic>
       <p:sp>
         <p:nvSpPr>
-          <p:cNvPr id="4" name="Content Placeholder 3">
+          <p:cNvPr id="7" name="TextBox 6">
             <a:extLst>
               <a:ext uri="{FF2B5EF4-FFF2-40B4-BE49-F238E27FC236}">
-                <a16:creationId xmlns:a16="http://schemas.microsoft.com/office/drawing/2014/main" id="{8B00685F-05AE-4218-8A6C-B8181DD361B4}"/>
+                <a16:creationId xmlns:a16="http://schemas.microsoft.com/office/drawing/2014/main" id="{8D0767D8-301B-0741-A1B6-F8297F8239C8}"/>
               </a:ext>
             </a:extLst>
           </p:cNvPr>
-          <p:cNvSpPr>
-            <a:spLocks noGrp="1"/>
-          </p:cNvSpPr>
-          <p:nvPr>
-            <p:ph sz="half" idx="2"/>
-          </p:nvPr>
+          <p:cNvSpPr txBox="1"/>
+          <p:nvPr/>
         </p:nvSpPr>
-        <p:spPr/>
+        <p:spPr>
+          <a:xfrm>
+            <a:off x="1141413" y="2199860"/>
+            <a:ext cx="4514924" cy="3046988"/>
+          </a:xfrm>
+          <a:prstGeom prst="rect">
+            <a:avLst/>
+          </a:prstGeom>
+          <a:noFill/>
+        </p:spPr>
         <p:txBody>
-          <a:bodyPr/>
+          <a:bodyPr wrap="square" rtlCol="0">
+            <a:spAutoFit/>
+          </a:bodyPr>
           <a:lstStyle/>
           <a:p>
-            <a:endParaRPr lang="en-US"/>
+            <a:r>
+              <a:rPr lang="en-US" sz="2400" dirty="0"/>
+              <a:t>42% Accuracy on Test Data</a:t>
+            </a:r>
+          </a:p>
+          <a:p>
+            <a:r>
+              <a:rPr lang="en-US" sz="2400" dirty="0"/>
+              <a:t>37% Accuracy on Training Data</a:t>
+            </a:r>
+          </a:p>
+          <a:p>
+            <a:endParaRPr lang="en-US" sz="2400" dirty="0"/>
+          </a:p>
+          <a:p>
+            <a:r>
+              <a:rPr lang="en-US" sz="2400" dirty="0"/>
+              <a:t>Using original dataset + 6 degree + 10 degree rotations</a:t>
+            </a:r>
+          </a:p>
+          <a:p>
+            <a:endParaRPr lang="en-US" sz="2400" dirty="0"/>
+          </a:p>
+          <a:p>
+            <a:r>
+              <a:rPr lang="en-US" sz="2400" dirty="0"/>
+              <a:t>Attempted to use PCA, yet accuracy was </a:t>
+            </a:r>
+            <a:r>
+              <a:rPr lang="en-US" sz="2400"/>
+              <a:t>much worse</a:t>
+            </a:r>
+            <a:endParaRPr lang="en-US" sz="2400" dirty="0"/>
           </a:p>
         </p:txBody>
       </p:sp>
     </p:spTree>
     <p:extLst>
       <p:ext uri="{BB962C8B-B14F-4D97-AF65-F5344CB8AC3E}">
-        <p14:creationId xmlns:p14="http://schemas.microsoft.com/office/powerpoint/2010/main" val="1567941571"/>
+        <p14:creationId xmlns:p14="http://schemas.microsoft.com/office/powerpoint/2010/main" val="4041029037"/>
       </p:ext>
     </p:extLst>
   </p:cSld>
@@ -13605,7 +13987,7 @@
 </p:sld>
 </file>
 
-<file path=ppt/slides/slide6.xml><?xml version="1.0" encoding="utf-8"?>
+<file path=ppt/slides/slide7.xml><?xml version="1.0" encoding="utf-8"?>
 <p:sld xmlns:a="http://schemas.openxmlformats.org/drawingml/2006/main" xmlns:r="http://schemas.openxmlformats.org/officeDocument/2006/relationships" xmlns:p="http://schemas.openxmlformats.org/presentationml/2006/main">
   <p:cSld>
     <p:spTree>
@@ -13713,7 +14095,7 @@
 </p:sld>
 </file>
 
-<file path=ppt/slides/slide7.xml><?xml version="1.0" encoding="utf-8"?>
+<file path=ppt/slides/slide8.xml><?xml version="1.0" encoding="utf-8"?>
 <p:sld xmlns:a="http://schemas.openxmlformats.org/drawingml/2006/main" xmlns:r="http://schemas.openxmlformats.org/officeDocument/2006/relationships" xmlns:p="http://schemas.openxmlformats.org/presentationml/2006/main">
   <p:cSld>
     <p:spTree>
@@ -13828,7 +14210,7 @@
 </p:sld>
 </file>
 
-<file path=ppt/slides/slide8.xml><?xml version="1.0" encoding="utf-8"?>
+<file path=ppt/slides/slide9.xml><?xml version="1.0" encoding="utf-8"?>
 <p:sld xmlns:a="http://schemas.openxmlformats.org/drawingml/2006/main" xmlns:r="http://schemas.openxmlformats.org/officeDocument/2006/relationships" xmlns:p="http://schemas.openxmlformats.org/presentationml/2006/main">
   <p:cSld>
     <p:spTree>
@@ -13850,7 +14232,7 @@
           <p:cNvPr id="2" name="Title 1">
             <a:extLst>
               <a:ext uri="{FF2B5EF4-FFF2-40B4-BE49-F238E27FC236}">
-                <a16:creationId xmlns:a16="http://schemas.microsoft.com/office/drawing/2014/main" id="{C55C24C6-B163-4227-BDFA-DB2684557434}"/>
+                <a16:creationId xmlns:a16="http://schemas.microsoft.com/office/drawing/2014/main" id="{DACA88CE-21C6-4B0E-A7F8-45202789E753}"/>
               </a:ext>
             </a:extLst>
           </p:cNvPr>
@@ -13868,109 +14250,65 @@
           <a:p>
             <a:r>
               <a:rPr lang="en-US" dirty="0"/>
-              <a:t>linear classifier</a:t>
+              <a:t>Expectation maximization analysis </a:t>
             </a:r>
           </a:p>
         </p:txBody>
       </p:sp>
-      <p:pic>
-        <p:nvPicPr>
-          <p:cNvPr id="5" name="Picture 4">
+      <p:sp>
+        <p:nvSpPr>
+          <p:cNvPr id="3" name="Content Placeholder 2">
             <a:extLst>
               <a:ext uri="{FF2B5EF4-FFF2-40B4-BE49-F238E27FC236}">
-                <a16:creationId xmlns:a16="http://schemas.microsoft.com/office/drawing/2014/main" id="{C6DCA446-9741-F641-9A2E-EBE48C542704}"/>
+                <a16:creationId xmlns:a16="http://schemas.microsoft.com/office/drawing/2014/main" id="{FA0C8D5D-E5D2-44E2-84C9-DB263BC00B11}"/>
               </a:ext>
             </a:extLst>
           </p:cNvPr>
-          <p:cNvPicPr>
-            <a:picLocks noChangeAspect="1"/>
-          </p:cNvPicPr>
-          <p:nvPr/>
-        </p:nvPicPr>
-        <p:blipFill>
-          <a:blip r:embed="rId2"/>
-          <a:stretch>
-            <a:fillRect/>
-          </a:stretch>
-        </p:blipFill>
-        <p:spPr>
-          <a:xfrm>
-            <a:off x="6535664" y="867949"/>
-            <a:ext cx="4958940" cy="2458278"/>
-          </a:xfrm>
-          <a:prstGeom prst="rect">
-            <a:avLst/>
-          </a:prstGeom>
-        </p:spPr>
-      </p:pic>
+          <p:cNvSpPr>
+            <a:spLocks noGrp="1"/>
+          </p:cNvSpPr>
+          <p:nvPr>
+            <p:ph sz="half" idx="1"/>
+          </p:nvPr>
+        </p:nvSpPr>
+        <p:spPr/>
+        <p:txBody>
+          <a:bodyPr/>
+          <a:lstStyle/>
+          <a:p>
+            <a:endParaRPr lang="en-US"/>
+          </a:p>
+        </p:txBody>
+      </p:sp>
       <p:sp>
         <p:nvSpPr>
-          <p:cNvPr id="7" name="TextBox 6">
+          <p:cNvPr id="4" name="Content Placeholder 3">
             <a:extLst>
               <a:ext uri="{FF2B5EF4-FFF2-40B4-BE49-F238E27FC236}">
-                <a16:creationId xmlns:a16="http://schemas.microsoft.com/office/drawing/2014/main" id="{8D0767D8-301B-0741-A1B6-F8297F8239C8}"/>
+                <a16:creationId xmlns:a16="http://schemas.microsoft.com/office/drawing/2014/main" id="{18B30F1E-0F8D-4C56-9A12-89065408D6AB}"/>
               </a:ext>
             </a:extLst>
           </p:cNvPr>
-          <p:cNvSpPr txBox="1"/>
-          <p:nvPr/>
+          <p:cNvSpPr>
+            <a:spLocks noGrp="1"/>
+          </p:cNvSpPr>
+          <p:nvPr>
+            <p:ph sz="half" idx="2"/>
+          </p:nvPr>
         </p:nvSpPr>
-        <p:spPr>
-          <a:xfrm>
-            <a:off x="1141413" y="2199860"/>
-            <a:ext cx="4514924" cy="3046988"/>
-          </a:xfrm>
-          <a:prstGeom prst="rect">
-            <a:avLst/>
-          </a:prstGeom>
-          <a:noFill/>
-        </p:spPr>
+        <p:spPr/>
         <p:txBody>
-          <a:bodyPr wrap="square" rtlCol="0">
-            <a:spAutoFit/>
-          </a:bodyPr>
+          <a:bodyPr/>
           <a:lstStyle/>
           <a:p>
-            <a:r>
-              <a:rPr lang="en-US" sz="2400" dirty="0"/>
-              <a:t>42% Accuracy on Test Data</a:t>
-            </a:r>
-          </a:p>
-          <a:p>
-            <a:r>
-              <a:rPr lang="en-US" sz="2400" dirty="0"/>
-              <a:t>37% Accuracy on Training Data</a:t>
-            </a:r>
-          </a:p>
-          <a:p>
-            <a:endParaRPr lang="en-US" sz="2400" dirty="0"/>
-          </a:p>
-          <a:p>
-            <a:r>
-              <a:rPr lang="en-US" sz="2400" dirty="0"/>
-              <a:t>Using original dataset + 6 degree + 10 degree rotations</a:t>
-            </a:r>
-          </a:p>
-          <a:p>
-            <a:endParaRPr lang="en-US" sz="2400" dirty="0"/>
-          </a:p>
-          <a:p>
-            <a:r>
-              <a:rPr lang="en-US" sz="2400" dirty="0"/>
-              <a:t>Attempted to use PCA, yet accuracy was </a:t>
-            </a:r>
-            <a:r>
-              <a:rPr lang="en-US" sz="2400"/>
-              <a:t>much worse</a:t>
-            </a:r>
-            <a:endParaRPr lang="en-US" sz="2400" dirty="0"/>
+            <a:endParaRPr lang="en-US"/>
           </a:p>
         </p:txBody>
       </p:sp>
     </p:spTree>
     <p:extLst>
       <p:ext uri="{BB962C8B-B14F-4D97-AF65-F5344CB8AC3E}">
-        <p14:creationId xmlns:p14="http://schemas.microsoft.com/office/powerpoint/2010/main" val="4041029037"/>
+        <p14:creationId xmlns:p14="http://schemas.microsoft.com/office/powerpoint/2010/main" val="3632896207"/>
       </p:ext>
     </p:extLst>
   </p:cSld>

</xml_diff>